<commit_message>
Lecture 3 after class
</commit_message>
<xml_diff>
--- a/DraftSlides/Lecture3.pptx
+++ b/DraftSlides/Lecture3.pptx
@@ -6,7 +6,7 @@
     <p:sldMasterId id="2147483652" r:id="rId2"/>
   </p:sldMasterIdLst>
   <p:notesMasterIdLst>
-    <p:notesMasterId r:id="rId35"/>
+    <p:notesMasterId r:id="rId25"/>
   </p:notesMasterIdLst>
   <p:sldIdLst>
     <p:sldId id="454" r:id="rId3"/>
@@ -31,16 +31,6 @@
     <p:sldId id="371" r:id="rId22"/>
     <p:sldId id="545" r:id="rId23"/>
     <p:sldId id="546" r:id="rId24"/>
-    <p:sldId id="322" r:id="rId25"/>
-    <p:sldId id="512" r:id="rId26"/>
-    <p:sldId id="517" r:id="rId27"/>
-    <p:sldId id="508" r:id="rId28"/>
-    <p:sldId id="549" r:id="rId29"/>
-    <p:sldId id="282" r:id="rId30"/>
-    <p:sldId id="518" r:id="rId31"/>
-    <p:sldId id="519" r:id="rId32"/>
-    <p:sldId id="503" r:id="rId33"/>
-    <p:sldId id="501" r:id="rId34"/>
   </p:sldIdLst>
   <p:sldSz cx="10080625" cy="7559675"/>
   <p:notesSz cx="7772400" cy="10058400"/>
@@ -7909,12 +7899,12 @@
   <pc:docChgLst>
     <pc:chgData name="Khattab, Sherif" userId="c83b1e15-36f3-4f46-aceb-05aac24c545e" providerId="ADAL" clId="{67E76620-E995-9B4F-8777-FF6F13242BF7}"/>
     <pc:docChg chg="undo custSel addSld delSld modSld sldOrd">
-      <pc:chgData name="Khattab, Sherif" userId="c83b1e15-36f3-4f46-aceb-05aac24c545e" providerId="ADAL" clId="{67E76620-E995-9B4F-8777-FF6F13242BF7}" dt="2022-01-20T06:30:37.554" v="2698"/>
+      <pc:chgData name="Khattab, Sherif" userId="c83b1e15-36f3-4f46-aceb-05aac24c545e" providerId="ADAL" clId="{67E76620-E995-9B4F-8777-FF6F13242BF7}" dt="2022-01-20T15:49:29.772" v="2699" actId="2696"/>
       <pc:docMkLst>
         <pc:docMk/>
       </pc:docMkLst>
-      <pc:sldChg chg="modSp mod ord modAnim">
-        <pc:chgData name="Khattab, Sherif" userId="c83b1e15-36f3-4f46-aceb-05aac24c545e" providerId="ADAL" clId="{67E76620-E995-9B4F-8777-FF6F13242BF7}" dt="2022-01-20T06:09:21.467" v="2661"/>
+      <pc:sldChg chg="modSp del mod ord modAnim">
+        <pc:chgData name="Khattab, Sherif" userId="c83b1e15-36f3-4f46-aceb-05aac24c545e" providerId="ADAL" clId="{67E76620-E995-9B4F-8777-FF6F13242BF7}" dt="2022-01-20T15:49:29.772" v="2699" actId="2696"/>
         <pc:sldMkLst>
           <pc:docMk/>
           <pc:sldMk cId="306268545" sldId="282"/>
@@ -7927,6 +7917,13 @@
             <ac:spMk id="29699" creationId="{00000000-0000-0000-0000-000000000000}"/>
           </ac:spMkLst>
         </pc:spChg>
+      </pc:sldChg>
+      <pc:sldChg chg="del">
+        <pc:chgData name="Khattab, Sherif" userId="c83b1e15-36f3-4f46-aceb-05aac24c545e" providerId="ADAL" clId="{67E76620-E995-9B4F-8777-FF6F13242BF7}" dt="2022-01-20T15:49:29.772" v="2699" actId="2696"/>
+        <pc:sldMkLst>
+          <pc:docMk/>
+          <pc:sldMk cId="2685283246" sldId="322"/>
+        </pc:sldMkLst>
       </pc:sldChg>
       <pc:sldChg chg="delSp modSp mod delAnim modAnim">
         <pc:chgData name="Khattab, Sherif" userId="c83b1e15-36f3-4f46-aceb-05aac24c545e" providerId="ADAL" clId="{67E76620-E995-9B4F-8777-FF6F13242BF7}" dt="2022-01-20T05:39:57.048" v="1748" actId="20577"/>
@@ -8088,8 +8085,15 @@
           <pc:sldMk cId="2782489002" sldId="497"/>
         </pc:sldMkLst>
       </pc:sldChg>
-      <pc:sldChg chg="modSp mod modAnim">
-        <pc:chgData name="Khattab, Sherif" userId="c83b1e15-36f3-4f46-aceb-05aac24c545e" providerId="ADAL" clId="{67E76620-E995-9B4F-8777-FF6F13242BF7}" dt="2022-01-20T06:04:20.154" v="2512"/>
+      <pc:sldChg chg="del">
+        <pc:chgData name="Khattab, Sherif" userId="c83b1e15-36f3-4f46-aceb-05aac24c545e" providerId="ADAL" clId="{67E76620-E995-9B4F-8777-FF6F13242BF7}" dt="2022-01-20T15:49:29.772" v="2699" actId="2696"/>
+        <pc:sldMkLst>
+          <pc:docMk/>
+          <pc:sldMk cId="3419089429" sldId="501"/>
+        </pc:sldMkLst>
+      </pc:sldChg>
+      <pc:sldChg chg="modSp del mod modAnim">
+        <pc:chgData name="Khattab, Sherif" userId="c83b1e15-36f3-4f46-aceb-05aac24c545e" providerId="ADAL" clId="{67E76620-E995-9B4F-8777-FF6F13242BF7}" dt="2022-01-20T15:49:29.772" v="2699" actId="2696"/>
         <pc:sldMkLst>
           <pc:docMk/>
           <pc:sldMk cId="4120720973" sldId="503"/>
@@ -8104,14 +8108,42 @@
         </pc:spChg>
       </pc:sldChg>
       <pc:sldChg chg="del">
+        <pc:chgData name="Khattab, Sherif" userId="c83b1e15-36f3-4f46-aceb-05aac24c545e" providerId="ADAL" clId="{67E76620-E995-9B4F-8777-FF6F13242BF7}" dt="2022-01-20T15:49:29.772" v="2699" actId="2696"/>
+        <pc:sldMkLst>
+          <pc:docMk/>
+          <pc:sldMk cId="2093362943" sldId="508"/>
+        </pc:sldMkLst>
+      </pc:sldChg>
+      <pc:sldChg chg="del">
+        <pc:chgData name="Khattab, Sherif" userId="c83b1e15-36f3-4f46-aceb-05aac24c545e" providerId="ADAL" clId="{67E76620-E995-9B4F-8777-FF6F13242BF7}" dt="2022-01-20T15:49:29.772" v="2699" actId="2696"/>
+        <pc:sldMkLst>
+          <pc:docMk/>
+          <pc:sldMk cId="2743959136" sldId="512"/>
+        </pc:sldMkLst>
+      </pc:sldChg>
+      <pc:sldChg chg="del">
         <pc:chgData name="Khattab, Sherif" userId="c83b1e15-36f3-4f46-aceb-05aac24c545e" providerId="ADAL" clId="{67E76620-E995-9B4F-8777-FF6F13242BF7}" dt="2022-01-20T05:25:24.203" v="1195" actId="2696"/>
         <pc:sldMkLst>
           <pc:docMk/>
           <pc:sldMk cId="3948097611" sldId="515"/>
         </pc:sldMkLst>
       </pc:sldChg>
-      <pc:sldChg chg="modSp mod">
-        <pc:chgData name="Khattab, Sherif" userId="c83b1e15-36f3-4f46-aceb-05aac24c545e" providerId="ADAL" clId="{67E76620-E995-9B4F-8777-FF6F13242BF7}" dt="2022-01-20T06:09:37.930" v="2662" actId="313"/>
+      <pc:sldChg chg="del">
+        <pc:chgData name="Khattab, Sherif" userId="c83b1e15-36f3-4f46-aceb-05aac24c545e" providerId="ADAL" clId="{67E76620-E995-9B4F-8777-FF6F13242BF7}" dt="2022-01-20T15:49:29.772" v="2699" actId="2696"/>
+        <pc:sldMkLst>
+          <pc:docMk/>
+          <pc:sldMk cId="1845419114" sldId="517"/>
+        </pc:sldMkLst>
+      </pc:sldChg>
+      <pc:sldChg chg="del">
+        <pc:chgData name="Khattab, Sherif" userId="c83b1e15-36f3-4f46-aceb-05aac24c545e" providerId="ADAL" clId="{67E76620-E995-9B4F-8777-FF6F13242BF7}" dt="2022-01-20T15:49:29.772" v="2699" actId="2696"/>
+        <pc:sldMkLst>
+          <pc:docMk/>
+          <pc:sldMk cId="2804781805" sldId="518"/>
+        </pc:sldMkLst>
+      </pc:sldChg>
+      <pc:sldChg chg="modSp del mod">
+        <pc:chgData name="Khattab, Sherif" userId="c83b1e15-36f3-4f46-aceb-05aac24c545e" providerId="ADAL" clId="{67E76620-E995-9B4F-8777-FF6F13242BF7}" dt="2022-01-20T15:49:29.772" v="2699" actId="2696"/>
         <pc:sldMkLst>
           <pc:docMk/>
           <pc:sldMk cId="1525193433" sldId="519"/>
@@ -8718,8 +8750,8 @@
           </ac:inkMkLst>
         </pc:inkChg>
       </pc:sldChg>
-      <pc:sldChg chg="addSp modSp new mod">
-        <pc:chgData name="Khattab, Sherif" userId="c83b1e15-36f3-4f46-aceb-05aac24c545e" providerId="ADAL" clId="{67E76620-E995-9B4F-8777-FF6F13242BF7}" dt="2022-01-20T06:06:39.694" v="2552"/>
+      <pc:sldChg chg="addSp modSp new del mod">
+        <pc:chgData name="Khattab, Sherif" userId="c83b1e15-36f3-4f46-aceb-05aac24c545e" providerId="ADAL" clId="{67E76620-E995-9B4F-8777-FF6F13242BF7}" dt="2022-01-20T15:49:29.772" v="2699" actId="2696"/>
         <pc:sldMkLst>
           <pc:docMk/>
           <pc:sldMk cId="2710097941" sldId="549"/>
@@ -11331,255 +11363,6 @@
     <p:extLst>
       <p:ext uri="{BB962C8B-B14F-4D97-AF65-F5344CB8AC3E}">
         <p14:creationId xmlns:p14="http://schemas.microsoft.com/office/powerpoint/2010/main" val="3068663691"/>
-      </p:ext>
-    </p:extLst>
-  </p:cSld>
-  <p:clrMapOvr>
-    <a:masterClrMapping/>
-  </p:clrMapOvr>
-</p:notes>
-</file>
-
-<file path=ppt/notesSlides/notesSlide2.xml><?xml version="1.0" encoding="utf-8"?>
-<p:notes xmlns:a="http://schemas.openxmlformats.org/drawingml/2006/main" xmlns:r="http://schemas.openxmlformats.org/officeDocument/2006/relationships" xmlns:p="http://schemas.openxmlformats.org/presentationml/2006/main">
-  <p:cSld>
-    <p:spTree>
-      <p:nvGrpSpPr>
-        <p:cNvPr id="1" name=""/>
-        <p:cNvGrpSpPr/>
-        <p:nvPr/>
-      </p:nvGrpSpPr>
-      <p:grpSpPr>
-        <a:xfrm>
-          <a:off x="0" y="0"/>
-          <a:ext cx="0" cy="0"/>
-          <a:chOff x="0" y="0"/>
-          <a:chExt cx="0" cy="0"/>
-        </a:xfrm>
-      </p:grpSpPr>
-      <p:sp>
-        <p:nvSpPr>
-          <p:cNvPr id="2" name="Slide Image Placeholder 1"/>
-          <p:cNvSpPr>
-            <a:spLocks noGrp="1" noRot="1" noChangeAspect="1"/>
-          </p:cNvSpPr>
-          <p:nvPr>
-            <p:ph type="sldImg"/>
-          </p:nvPr>
-        </p:nvSpPr>
-        <p:spPr/>
-      </p:sp>
-      <p:sp>
-        <p:nvSpPr>
-          <p:cNvPr id="3" name="Notes Placeholder 2"/>
-          <p:cNvSpPr>
-            <a:spLocks noGrp="1"/>
-          </p:cNvSpPr>
-          <p:nvPr>
-            <p:ph type="body" idx="1"/>
-          </p:nvPr>
-        </p:nvSpPr>
-        <p:spPr/>
-        <p:txBody>
-          <a:bodyPr/>
-          <a:lstStyle/>
-          <a:p>
-            <a:r>
-              <a:rPr lang="en-US" dirty="0"/>
-              <a:t> </a:t>
-            </a:r>
-          </a:p>
-        </p:txBody>
-      </p:sp>
-      <p:sp>
-        <p:nvSpPr>
-          <p:cNvPr id="4" name="Slide Number Placeholder 3"/>
-          <p:cNvSpPr>
-            <a:spLocks noGrp="1"/>
-          </p:cNvSpPr>
-          <p:nvPr>
-            <p:ph type="sldNum"/>
-          </p:nvPr>
-        </p:nvSpPr>
-        <p:spPr/>
-        <p:txBody>
-          <a:bodyPr/>
-          <a:lstStyle/>
-          <a:p>
-            <a:pPr marL="0" marR="0" lvl="0" indent="0" algn="r" defTabSz="457200" rtl="0" eaLnBrk="1" fontAlgn="base" latinLnBrk="0" hangingPunct="0">
-              <a:lnSpc>
-                <a:spcPct val="96000"/>
-              </a:lnSpc>
-              <a:spcBef>
-                <a:spcPct val="0"/>
-              </a:spcBef>
-              <a:spcAft>
-                <a:spcPct val="0"/>
-              </a:spcAft>
-              <a:buClr>
-                <a:srgbClr val="000000"/>
-              </a:buClr>
-              <a:buSzPct val="100000"/>
-              <a:buFont typeface="Times New Roman" panose="02020603050405020304" pitchFamily="18" charset="0"/>
-              <a:buNone/>
-              <a:tabLst>
-                <a:tab pos="723900" algn="l"/>
-                <a:tab pos="1447800" algn="l"/>
-                <a:tab pos="2171700" algn="l"/>
-                <a:tab pos="2895600" algn="l"/>
-              </a:tabLst>
-              <a:defRPr/>
-            </a:pPr>
-            <a:fld id="{6BBF61AC-9675-4DE0-97B3-F33B7A218B95}" type="slidenum">
-              <a:rPr kumimoji="0" lang="en-GB" altLang="en-US" sz="1400" b="0" i="0" u="none" strike="noStrike" kern="1200" cap="none" spc="0" normalizeH="0" baseline="0" noProof="0" smtClean="0">
-                <a:ln>
-                  <a:noFill/>
-                </a:ln>
-                <a:solidFill>
-                  <a:srgbClr val="000000"/>
-                </a:solidFill>
-                <a:effectLst/>
-                <a:uLnTx/>
-                <a:uFillTx/>
-                <a:latin typeface="Times New Roman" panose="02020603050405020304" pitchFamily="18" charset="0"/>
-                <a:ea typeface="Arial Unicode MS" panose="020B0604020202020204" pitchFamily="34" charset="-128"/>
-              </a:rPr>
-              <a:pPr marL="0" marR="0" lvl="0" indent="0" algn="r" defTabSz="457200" rtl="0" eaLnBrk="1" fontAlgn="base" latinLnBrk="0" hangingPunct="0">
-                <a:lnSpc>
-                  <a:spcPct val="96000"/>
-                </a:lnSpc>
-                <a:spcBef>
-                  <a:spcPct val="0"/>
-                </a:spcBef>
-                <a:spcAft>
-                  <a:spcPct val="0"/>
-                </a:spcAft>
-                <a:buClr>
-                  <a:srgbClr val="000000"/>
-                </a:buClr>
-                <a:buSzPct val="100000"/>
-                <a:buFont typeface="Times New Roman" panose="02020603050405020304" pitchFamily="18" charset="0"/>
-                <a:buNone/>
-                <a:tabLst>
-                  <a:tab pos="723900" algn="l"/>
-                  <a:tab pos="1447800" algn="l"/>
-                  <a:tab pos="2171700" algn="l"/>
-                  <a:tab pos="2895600" algn="l"/>
-                </a:tabLst>
-                <a:defRPr/>
-              </a:pPr>
-              <a:t>25</a:t>
-            </a:fld>
-            <a:endParaRPr kumimoji="0" lang="en-GB" altLang="en-US" sz="1400" b="0" i="0" u="none" strike="noStrike" kern="1200" cap="none" spc="0" normalizeH="0" baseline="0" noProof="0">
-              <a:ln>
-                <a:noFill/>
-              </a:ln>
-              <a:solidFill>
-                <a:srgbClr val="000000"/>
-              </a:solidFill>
-              <a:effectLst/>
-              <a:uLnTx/>
-              <a:uFillTx/>
-              <a:latin typeface="Times New Roman" panose="02020603050405020304" pitchFamily="18" charset="0"/>
-              <a:ea typeface="Arial Unicode MS" panose="020B0604020202020204" pitchFamily="34" charset="-128"/>
-            </a:endParaRPr>
-          </a:p>
-        </p:txBody>
-      </p:sp>
-    </p:spTree>
-    <p:extLst>
-      <p:ext uri="{BB962C8B-B14F-4D97-AF65-F5344CB8AC3E}">
-        <p14:creationId xmlns:p14="http://schemas.microsoft.com/office/powerpoint/2010/main" val="2347785079"/>
-      </p:ext>
-    </p:extLst>
-  </p:cSld>
-  <p:clrMapOvr>
-    <a:masterClrMapping/>
-  </p:clrMapOvr>
-</p:notes>
-</file>
-
-<file path=ppt/notesSlides/notesSlide3.xml><?xml version="1.0" encoding="utf-8"?>
-<p:notes xmlns:a="http://schemas.openxmlformats.org/drawingml/2006/main" xmlns:r="http://schemas.openxmlformats.org/officeDocument/2006/relationships" xmlns:p="http://schemas.openxmlformats.org/presentationml/2006/main">
-  <p:cSld>
-    <p:spTree>
-      <p:nvGrpSpPr>
-        <p:cNvPr id="1" name=""/>
-        <p:cNvGrpSpPr/>
-        <p:nvPr/>
-      </p:nvGrpSpPr>
-      <p:grpSpPr>
-        <a:xfrm>
-          <a:off x="0" y="0"/>
-          <a:ext cx="0" cy="0"/>
-          <a:chOff x="0" y="0"/>
-          <a:chExt cx="0" cy="0"/>
-        </a:xfrm>
-      </p:grpSpPr>
-      <p:sp>
-        <p:nvSpPr>
-          <p:cNvPr id="94210" name="Rectangle 2"/>
-          <p:cNvSpPr>
-            <a:spLocks noGrp="1" noRot="1" noChangeAspect="1" noChangeArrowheads="1" noTextEdit="1"/>
-          </p:cNvSpPr>
-          <p:nvPr>
-            <p:ph type="sldImg"/>
-          </p:nvPr>
-        </p:nvSpPr>
-        <p:spPr>
-          <a:ln/>
-        </p:spPr>
-      </p:sp>
-      <p:sp>
-        <p:nvSpPr>
-          <p:cNvPr id="94211" name="Rectangle 3"/>
-          <p:cNvSpPr>
-            <a:spLocks noGrp="1" noChangeArrowheads="1"/>
-          </p:cNvSpPr>
-          <p:nvPr>
-            <p:ph type="body" idx="1"/>
-          </p:nvPr>
-        </p:nvSpPr>
-        <p:spPr>
-          <a:noFill/>
-          <a:ln/>
-          <a:extLst>
-            <a:ext uri="{909E8E84-426E-40DD-AFC4-6F175D3DCCD1}">
-              <a14:hiddenFill xmlns:a14="http://schemas.microsoft.com/office/drawing/2010/main">
-                <a:solidFill>
-                  <a:srgbClr val="FFFFFF"/>
-                </a:solidFill>
-              </a14:hiddenFill>
-            </a:ext>
-            <a:ext uri="{91240B29-F687-4F45-9708-019B960494DF}">
-              <a14:hiddenLine xmlns:a14="http://schemas.microsoft.com/office/drawing/2010/main" w="9525">
-                <a:solidFill>
-                  <a:srgbClr val="000000"/>
-                </a:solidFill>
-                <a:miter lim="800000"/>
-                <a:headEnd/>
-                <a:tailEnd/>
-              </a14:hiddenLine>
-            </a:ext>
-            <a:ext uri="{FAA26D3D-D897-4be2-8F04-BA451C77F1D7}">
-              <ma14:placeholderFlag xmlns="" xmlns:ma14="http://schemas.microsoft.com/office/mac/drawingml/2011/main" val="1"/>
-            </a:ext>
-          </a:extLst>
-        </p:spPr>
-        <p:txBody>
-          <a:bodyPr/>
-          <a:lstStyle/>
-          <a:p>
-            <a:endParaRPr lang="en-US" altLang="en-US">
-              <a:ea typeface="MS PGothic" charset="-128"/>
-            </a:endParaRPr>
-          </a:p>
-        </p:txBody>
-      </p:sp>
-    </p:spTree>
-    <p:extLst>
-      <p:ext uri="{BB962C8B-B14F-4D97-AF65-F5344CB8AC3E}">
-        <p14:creationId xmlns:p14="http://schemas.microsoft.com/office/powerpoint/2010/main" val="2084617603"/>
       </p:ext>
     </p:extLst>
   </p:cSld>
@@ -27173,2580 +26956,6 @@
 </p:sld>
 </file>
 
-<file path=ppt/slides/slide23.xml><?xml version="1.0" encoding="utf-8"?>
-<p:sld xmlns:a="http://schemas.openxmlformats.org/drawingml/2006/main" xmlns:r="http://schemas.openxmlformats.org/officeDocument/2006/relationships" xmlns:p="http://schemas.openxmlformats.org/presentationml/2006/main">
-  <p:cSld>
-    <p:spTree>
-      <p:nvGrpSpPr>
-        <p:cNvPr id="1" name=""/>
-        <p:cNvGrpSpPr/>
-        <p:nvPr/>
-      </p:nvGrpSpPr>
-      <p:grpSpPr>
-        <a:xfrm>
-          <a:off x="0" y="0"/>
-          <a:ext cx="0" cy="0"/>
-          <a:chOff x="0" y="0"/>
-          <a:chExt cx="0" cy="0"/>
-        </a:xfrm>
-      </p:grpSpPr>
-      <p:sp>
-        <p:nvSpPr>
-          <p:cNvPr id="90114" name="Rectangle 2">
-            <a:extLst>
-              <a:ext uri="{FF2B5EF4-FFF2-40B4-BE49-F238E27FC236}">
-                <a16:creationId xmlns:a16="http://schemas.microsoft.com/office/drawing/2014/main" id="{308C4648-C13A-A547-ABA8-14DA70E0773D}"/>
-              </a:ext>
-            </a:extLst>
-          </p:cNvPr>
-          <p:cNvSpPr>
-            <a:spLocks noGrp="1" noChangeArrowheads="1"/>
-          </p:cNvSpPr>
-          <p:nvPr>
-            <p:ph type="title"/>
-          </p:nvPr>
-        </p:nvSpPr>
-        <p:spPr/>
-        <p:txBody>
-          <a:bodyPr/>
-          <a:lstStyle/>
-          <a:p>
-            <a:r>
-              <a:rPr lang="en-US" altLang="en-US" dirty="0"/>
-              <a:t>Why do we need Synchronization?</a:t>
-            </a:r>
-          </a:p>
-        </p:txBody>
-      </p:sp>
-      <p:sp>
-        <p:nvSpPr>
-          <p:cNvPr id="90115" name="Rectangle 3">
-            <a:extLst>
-              <a:ext uri="{FF2B5EF4-FFF2-40B4-BE49-F238E27FC236}">
-                <a16:creationId xmlns:a16="http://schemas.microsoft.com/office/drawing/2014/main" id="{691666FD-EDA0-044F-A826-5F64B00DC362}"/>
-              </a:ext>
-            </a:extLst>
-          </p:cNvPr>
-          <p:cNvSpPr>
-            <a:spLocks noGrp="1" noChangeArrowheads="1"/>
-          </p:cNvSpPr>
-          <p:nvPr>
-            <p:ph idx="1"/>
-          </p:nvPr>
-        </p:nvSpPr>
-        <p:spPr/>
-        <p:txBody>
-          <a:bodyPr/>
-          <a:lstStyle/>
-          <a:p>
-            <a:r>
-              <a:rPr lang="en-US" altLang="en-US"/>
-              <a:t>Each process operates sequentially</a:t>
-            </a:r>
-          </a:p>
-          <a:p>
-            <a:r>
-              <a:rPr lang="en-US" altLang="en-US"/>
-              <a:t>All is fine until processes want to share data</a:t>
-            </a:r>
-          </a:p>
-          <a:p>
-            <a:pPr lvl="1"/>
-            <a:r>
-              <a:rPr lang="en-US" altLang="en-US"/>
-              <a:t>Exchange data between multiple processes</a:t>
-            </a:r>
-          </a:p>
-          <a:p>
-            <a:pPr lvl="1"/>
-            <a:r>
-              <a:rPr lang="en-US" altLang="en-US"/>
-              <a:t>Allow processes to navigate </a:t>
-            </a:r>
-            <a:r>
-              <a:rPr lang="en-US" altLang="en-US" i="1"/>
-              <a:t>critical regions</a:t>
-            </a:r>
-            <a:endParaRPr lang="en-US" altLang="en-US"/>
-          </a:p>
-          <a:p>
-            <a:pPr lvl="1"/>
-            <a:r>
-              <a:rPr lang="en-US" altLang="en-US"/>
-              <a:t>Maintain proper sequencing of actions in multiple processes</a:t>
-            </a:r>
-          </a:p>
-          <a:p>
-            <a:r>
-              <a:rPr lang="en-US" altLang="en-US"/>
-              <a:t>These issues apply to threads as well	</a:t>
-            </a:r>
-          </a:p>
-          <a:p>
-            <a:pPr lvl="1"/>
-            <a:r>
-              <a:rPr lang="en-US" altLang="en-US"/>
-              <a:t>Threads can share data easily (same address space)</a:t>
-            </a:r>
-          </a:p>
-          <a:p>
-            <a:pPr lvl="1"/>
-            <a:r>
-              <a:rPr lang="en-US" altLang="en-US"/>
-              <a:t>Other two issues apply to threads</a:t>
-            </a:r>
-          </a:p>
-        </p:txBody>
-      </p:sp>
-      <p:sp>
-        <p:nvSpPr>
-          <p:cNvPr id="4" name="Footer Placeholder 3">
-            <a:extLst>
-              <a:ext uri="{FF2B5EF4-FFF2-40B4-BE49-F238E27FC236}">
-                <a16:creationId xmlns:a16="http://schemas.microsoft.com/office/drawing/2014/main" id="{98D70E46-AD06-A84D-A403-48FFDDB68BC6}"/>
-              </a:ext>
-            </a:extLst>
-          </p:cNvPr>
-          <p:cNvSpPr>
-            <a:spLocks noGrp="1"/>
-          </p:cNvSpPr>
-          <p:nvPr>
-            <p:ph type="ftr" idx="11"/>
-          </p:nvPr>
-        </p:nvSpPr>
-        <p:spPr/>
-        <p:txBody>
-          <a:bodyPr/>
-          <a:lstStyle/>
-          <a:p>
-            <a:pPr marL="0" marR="0" lvl="0" indent="0" algn="ctr" defTabSz="1007943" rtl="0" eaLnBrk="1" fontAlgn="base" latinLnBrk="0" hangingPunct="0">
-              <a:lnSpc>
-                <a:spcPct val="100000"/>
-              </a:lnSpc>
-              <a:spcBef>
-                <a:spcPct val="0"/>
-              </a:spcBef>
-              <a:spcAft>
-                <a:spcPct val="0"/>
-              </a:spcAft>
-              <a:buClrTx/>
-              <a:buSzTx/>
-              <a:buFont typeface="Times New Roman" pitchFamily="16" charset="0"/>
-              <a:buNone/>
-              <a:tabLst>
-                <a:tab pos="0" algn="l"/>
-                <a:tab pos="457200" algn="l"/>
-                <a:tab pos="914400" algn="l"/>
-                <a:tab pos="1371600" algn="l"/>
-                <a:tab pos="1828800" algn="l"/>
-                <a:tab pos="2286000" algn="l"/>
-                <a:tab pos="2743200" algn="l"/>
-                <a:tab pos="3200400" algn="l"/>
-                <a:tab pos="3657600" algn="l"/>
-                <a:tab pos="4114800" algn="l"/>
-                <a:tab pos="4572000" algn="l"/>
-                <a:tab pos="5029200" algn="l"/>
-                <a:tab pos="5486400" algn="l"/>
-                <a:tab pos="5943600" algn="l"/>
-                <a:tab pos="6400800" algn="l"/>
-                <a:tab pos="6858000" algn="l"/>
-                <a:tab pos="7315200" algn="l"/>
-                <a:tab pos="7772400" algn="l"/>
-                <a:tab pos="8229600" algn="l"/>
-                <a:tab pos="8686800" algn="l"/>
-                <a:tab pos="9144000" algn="l"/>
-              </a:tabLst>
-              <a:defRPr/>
-            </a:pPr>
-            <a:r>
-              <a:rPr kumimoji="0" lang="en-US" altLang="en-US" sz="1400" b="0" i="0" u="none" strike="noStrike" kern="1200" cap="none" spc="0" normalizeH="0" baseline="0" noProof="0">
-                <a:ln>
-                  <a:noFill/>
-                </a:ln>
-                <a:solidFill>
-                  <a:srgbClr val="000000"/>
-                </a:solidFill>
-                <a:effectLst/>
-                <a:uLnTx/>
-                <a:uFillTx/>
-                <a:latin typeface="Arial"/>
-                <a:ea typeface="+mn-ea"/>
-                <a:cs typeface="Arial"/>
-              </a:rPr>
-              <a:t>CS/COE 1550 – Operating Systems – Sherif Khattab</a:t>
-            </a:r>
-          </a:p>
-        </p:txBody>
-      </p:sp>
-      <p:sp>
-        <p:nvSpPr>
-          <p:cNvPr id="5" name="Slide Number Placeholder 4">
-            <a:extLst>
-              <a:ext uri="{FF2B5EF4-FFF2-40B4-BE49-F238E27FC236}">
-                <a16:creationId xmlns:a16="http://schemas.microsoft.com/office/drawing/2014/main" id="{68F74981-ADDA-9144-ACB5-CE4649DD2D8F}"/>
-              </a:ext>
-            </a:extLst>
-          </p:cNvPr>
-          <p:cNvSpPr>
-            <a:spLocks noGrp="1"/>
-          </p:cNvSpPr>
-          <p:nvPr>
-            <p:ph type="sldNum" idx="12"/>
-          </p:nvPr>
-        </p:nvSpPr>
-        <p:spPr/>
-        <p:txBody>
-          <a:bodyPr/>
-          <a:lstStyle/>
-          <a:p>
-            <a:pPr marL="0" marR="0" lvl="0" indent="0" algn="r" defTabSz="1007943" rtl="0" eaLnBrk="1" fontAlgn="base" latinLnBrk="0" hangingPunct="0">
-              <a:lnSpc>
-                <a:spcPct val="100000"/>
-              </a:lnSpc>
-              <a:spcBef>
-                <a:spcPct val="0"/>
-              </a:spcBef>
-              <a:spcAft>
-                <a:spcPct val="0"/>
-              </a:spcAft>
-              <a:buClrTx/>
-              <a:buSzTx/>
-              <a:buFont typeface="Times New Roman" panose="02020603050405020304" pitchFamily="18" charset="0"/>
-              <a:buNone/>
-              <a:tabLst/>
-              <a:defRPr/>
-            </a:pPr>
-            <a:fld id="{84EF06AB-4700-6A49-AA92-7F6FC9BCAFBB}" type="slidenum">
-              <a:rPr kumimoji="0" lang="en-US" altLang="en-US" sz="1400" b="0" i="0" u="none" strike="noStrike" kern="1200" cap="none" spc="0" normalizeH="0" baseline="0" noProof="0">
-                <a:ln>
-                  <a:noFill/>
-                </a:ln>
-                <a:solidFill>
-                  <a:srgbClr val="000000"/>
-                </a:solidFill>
-                <a:effectLst/>
-                <a:uLnTx/>
-                <a:uFillTx/>
-                <a:latin typeface="Arial"/>
-                <a:ea typeface="+mn-ea"/>
-                <a:cs typeface="Arial"/>
-              </a:rPr>
-              <a:pPr marL="0" marR="0" lvl="0" indent="0" algn="r" defTabSz="1007943" rtl="0" eaLnBrk="1" fontAlgn="base" latinLnBrk="0" hangingPunct="0">
-                <a:lnSpc>
-                  <a:spcPct val="100000"/>
-                </a:lnSpc>
-                <a:spcBef>
-                  <a:spcPct val="0"/>
-                </a:spcBef>
-                <a:spcAft>
-                  <a:spcPct val="0"/>
-                </a:spcAft>
-                <a:buClrTx/>
-                <a:buSzTx/>
-                <a:buFont typeface="Times New Roman" panose="02020603050405020304" pitchFamily="18" charset="0"/>
-                <a:buNone/>
-                <a:tabLst/>
-                <a:defRPr/>
-              </a:pPr>
-              <a:t>23</a:t>
-            </a:fld>
-            <a:endParaRPr kumimoji="0" lang="en-US" altLang="en-US" sz="1400" b="0" i="0" u="none" strike="noStrike" kern="1200" cap="none" spc="0" normalizeH="0" baseline="0" noProof="0">
-              <a:ln>
-                <a:noFill/>
-              </a:ln>
-              <a:solidFill>
-                <a:srgbClr val="000000"/>
-              </a:solidFill>
-              <a:effectLst/>
-              <a:uLnTx/>
-              <a:uFillTx/>
-              <a:latin typeface="Arial"/>
-              <a:ea typeface="+mn-ea"/>
-              <a:cs typeface="Arial"/>
-            </a:endParaRPr>
-          </a:p>
-        </p:txBody>
-      </p:sp>
-    </p:spTree>
-    <p:extLst>
-      <p:ext uri="{BB962C8B-B14F-4D97-AF65-F5344CB8AC3E}">
-        <p14:creationId xmlns:p14="http://schemas.microsoft.com/office/powerpoint/2010/main" val="2685283246"/>
-      </p:ext>
-    </p:extLst>
-  </p:cSld>
-  <p:clrMapOvr>
-    <a:masterClrMapping/>
-  </p:clrMapOvr>
-</p:sld>
-</file>
-
-<file path=ppt/slides/slide24.xml><?xml version="1.0" encoding="utf-8"?>
-<p:sld xmlns:a="http://schemas.openxmlformats.org/drawingml/2006/main" xmlns:r="http://schemas.openxmlformats.org/officeDocument/2006/relationships" xmlns:p="http://schemas.openxmlformats.org/presentationml/2006/main">
-  <p:cSld>
-    <p:spTree>
-      <p:nvGrpSpPr>
-        <p:cNvPr id="1" name=""/>
-        <p:cNvGrpSpPr/>
-        <p:nvPr/>
-      </p:nvGrpSpPr>
-      <p:grpSpPr>
-        <a:xfrm>
-          <a:off x="0" y="0"/>
-          <a:ext cx="0" cy="0"/>
-          <a:chOff x="0" y="0"/>
-          <a:chExt cx="0" cy="0"/>
-        </a:xfrm>
-      </p:grpSpPr>
-      <p:sp>
-        <p:nvSpPr>
-          <p:cNvPr id="2" name="Title 1">
-            <a:extLst>
-              <a:ext uri="{FF2B5EF4-FFF2-40B4-BE49-F238E27FC236}">
-                <a16:creationId xmlns:a16="http://schemas.microsoft.com/office/drawing/2014/main" id="{32DBCD6D-0035-48A2-AE34-43966A977589}"/>
-              </a:ext>
-            </a:extLst>
-          </p:cNvPr>
-          <p:cNvSpPr>
-            <a:spLocks noGrp="1"/>
-          </p:cNvSpPr>
-          <p:nvPr>
-            <p:ph type="title"/>
-          </p:nvPr>
-        </p:nvSpPr>
-        <p:spPr/>
-        <p:txBody>
-          <a:bodyPr/>
-          <a:lstStyle/>
-          <a:p>
-            <a:r>
-              <a:rPr lang="en-US" dirty="0"/>
-              <a:t>Process vs. Thread</a:t>
-            </a:r>
-          </a:p>
-        </p:txBody>
-      </p:sp>
-      <p:sp>
-        <p:nvSpPr>
-          <p:cNvPr id="4" name="Footer Placeholder 3">
-            <a:extLst>
-              <a:ext uri="{FF2B5EF4-FFF2-40B4-BE49-F238E27FC236}">
-                <a16:creationId xmlns:a16="http://schemas.microsoft.com/office/drawing/2014/main" id="{0E7B03E5-535D-472E-98AC-2E5577E357CA}"/>
-              </a:ext>
-            </a:extLst>
-          </p:cNvPr>
-          <p:cNvSpPr>
-            <a:spLocks noGrp="1"/>
-          </p:cNvSpPr>
-          <p:nvPr>
-            <p:ph type="ftr" idx="11"/>
-          </p:nvPr>
-        </p:nvSpPr>
-        <p:spPr/>
-        <p:txBody>
-          <a:bodyPr/>
-          <a:lstStyle/>
-          <a:p>
-            <a:pPr marL="0" marR="0" lvl="0" indent="0" algn="ctr" defTabSz="457200" rtl="0" eaLnBrk="1" fontAlgn="base" latinLnBrk="0" hangingPunct="0">
-              <a:lnSpc>
-                <a:spcPct val="96000"/>
-              </a:lnSpc>
-              <a:spcBef>
-                <a:spcPct val="0"/>
-              </a:spcBef>
-              <a:spcAft>
-                <a:spcPct val="0"/>
-              </a:spcAft>
-              <a:buClr>
-                <a:srgbClr val="000000"/>
-              </a:buClr>
-              <a:buSzPct val="100000"/>
-              <a:buFont typeface="Times New Roman" pitchFamily="16" charset="0"/>
-              <a:buNone/>
-              <a:tabLst>
-                <a:tab pos="0" algn="l"/>
-                <a:tab pos="457200" algn="l"/>
-                <a:tab pos="914400" algn="l"/>
-                <a:tab pos="1371600" algn="l"/>
-                <a:tab pos="1828800" algn="l"/>
-                <a:tab pos="2286000" algn="l"/>
-                <a:tab pos="2743200" algn="l"/>
-                <a:tab pos="3200400" algn="l"/>
-                <a:tab pos="3657600" algn="l"/>
-                <a:tab pos="4114800" algn="l"/>
-                <a:tab pos="4572000" algn="l"/>
-                <a:tab pos="5029200" algn="l"/>
-                <a:tab pos="5486400" algn="l"/>
-                <a:tab pos="5943600" algn="l"/>
-                <a:tab pos="6400800" algn="l"/>
-                <a:tab pos="6858000" algn="l"/>
-                <a:tab pos="7315200" algn="l"/>
-                <a:tab pos="7772400" algn="l"/>
-                <a:tab pos="8229600" algn="l"/>
-                <a:tab pos="8686800" algn="l"/>
-                <a:tab pos="9144000" algn="l"/>
-              </a:tabLst>
-              <a:defRPr/>
-            </a:pPr>
-            <a:r>
-              <a:rPr kumimoji="0" lang="en-US" sz="1400" b="0" i="0" u="none" strike="noStrike" kern="1200" cap="none" spc="0" normalizeH="0" baseline="0" noProof="0">
-                <a:ln>
-                  <a:noFill/>
-                </a:ln>
-                <a:solidFill>
-                  <a:srgbClr val="000000"/>
-                </a:solidFill>
-                <a:effectLst/>
-                <a:uLnTx/>
-                <a:uFillTx/>
-                <a:latin typeface="Arial"/>
-                <a:ea typeface="+mn-ea"/>
-                <a:cs typeface="Arial" charset="0"/>
-              </a:rPr>
-              <a:t>CS/COE 1550 – Operating Systems – Sherif Khattab</a:t>
-            </a:r>
-            <a:endParaRPr kumimoji="0" lang="en-GB" sz="1400" b="0" i="0" u="none" strike="noStrike" kern="1200" cap="none" spc="0" normalizeH="0" baseline="0" noProof="0" dirty="0">
-              <a:ln>
-                <a:noFill/>
-              </a:ln>
-              <a:solidFill>
-                <a:srgbClr val="000000"/>
-              </a:solidFill>
-              <a:effectLst/>
-              <a:uLnTx/>
-              <a:uFillTx/>
-              <a:latin typeface="Times New Roman" pitchFamily="16" charset="0"/>
-              <a:ea typeface="+mn-ea"/>
-              <a:cs typeface="Arial" charset="0"/>
-            </a:endParaRPr>
-          </a:p>
-        </p:txBody>
-      </p:sp>
-      <p:sp>
-        <p:nvSpPr>
-          <p:cNvPr id="5" name="Slide Number Placeholder 4">
-            <a:extLst>
-              <a:ext uri="{FF2B5EF4-FFF2-40B4-BE49-F238E27FC236}">
-                <a16:creationId xmlns:a16="http://schemas.microsoft.com/office/drawing/2014/main" id="{78616229-F3A1-431A-B9BF-8875C967ADB4}"/>
-              </a:ext>
-            </a:extLst>
-          </p:cNvPr>
-          <p:cNvSpPr>
-            <a:spLocks noGrp="1"/>
-          </p:cNvSpPr>
-          <p:nvPr>
-            <p:ph type="sldNum" idx="12"/>
-          </p:nvPr>
-        </p:nvSpPr>
-        <p:spPr/>
-        <p:txBody>
-          <a:bodyPr/>
-          <a:lstStyle/>
-          <a:p>
-            <a:pPr marL="0" marR="0" lvl="0" indent="0" algn="r" defTabSz="457200" rtl="0" eaLnBrk="1" fontAlgn="base" latinLnBrk="0" hangingPunct="0">
-              <a:lnSpc>
-                <a:spcPct val="96000"/>
-              </a:lnSpc>
-              <a:spcBef>
-                <a:spcPct val="0"/>
-              </a:spcBef>
-              <a:spcAft>
-                <a:spcPct val="0"/>
-              </a:spcAft>
-              <a:buClr>
-                <a:srgbClr val="000000"/>
-              </a:buClr>
-              <a:buSzPct val="100000"/>
-              <a:buFont typeface="Times New Roman" panose="02020603050405020304" pitchFamily="18" charset="0"/>
-              <a:buNone/>
-              <a:tabLst/>
-              <a:defRPr/>
-            </a:pPr>
-            <a:fld id="{65E435D9-63B0-4660-8D04-E83F5E2CA2AE}" type="slidenum">
-              <a:rPr kumimoji="0" lang="en-GB" altLang="en-US" sz="1400" b="0" i="0" u="none" strike="noStrike" kern="1200" cap="none" spc="0" normalizeH="0" baseline="0" noProof="0" smtClean="0">
-                <a:ln>
-                  <a:noFill/>
-                </a:ln>
-                <a:solidFill>
-                  <a:srgbClr val="000000"/>
-                </a:solidFill>
-                <a:effectLst/>
-                <a:uLnTx/>
-                <a:uFillTx/>
-                <a:latin typeface="Times New Roman" panose="02020603050405020304" pitchFamily="18" charset="0"/>
-                <a:ea typeface="+mn-ea"/>
-                <a:cs typeface="Arial" panose="020B0604020202020204" pitchFamily="34" charset="0"/>
-              </a:rPr>
-              <a:pPr marL="0" marR="0" lvl="0" indent="0" algn="r" defTabSz="457200" rtl="0" eaLnBrk="1" fontAlgn="base" latinLnBrk="0" hangingPunct="0">
-                <a:lnSpc>
-                  <a:spcPct val="96000"/>
-                </a:lnSpc>
-                <a:spcBef>
-                  <a:spcPct val="0"/>
-                </a:spcBef>
-                <a:spcAft>
-                  <a:spcPct val="0"/>
-                </a:spcAft>
-                <a:buClr>
-                  <a:srgbClr val="000000"/>
-                </a:buClr>
-                <a:buSzPct val="100000"/>
-                <a:buFont typeface="Times New Roman" panose="02020603050405020304" pitchFamily="18" charset="0"/>
-                <a:buNone/>
-                <a:tabLst/>
-                <a:defRPr/>
-              </a:pPr>
-              <a:t>24</a:t>
-            </a:fld>
-            <a:endParaRPr kumimoji="0" lang="en-GB" altLang="en-US" sz="1400" b="0" i="0" u="none" strike="noStrike" kern="1200" cap="none" spc="0" normalizeH="0" baseline="0" noProof="0" dirty="0">
-              <a:ln>
-                <a:noFill/>
-              </a:ln>
-              <a:solidFill>
-                <a:srgbClr val="000000"/>
-              </a:solidFill>
-              <a:effectLst/>
-              <a:uLnTx/>
-              <a:uFillTx/>
-              <a:latin typeface="Times New Roman" panose="02020603050405020304" pitchFamily="18" charset="0"/>
-              <a:ea typeface="+mn-ea"/>
-              <a:cs typeface="Arial" panose="020B0604020202020204" pitchFamily="34" charset="0"/>
-            </a:endParaRPr>
-          </a:p>
-        </p:txBody>
-      </p:sp>
-      <p:pic>
-        <p:nvPicPr>
-          <p:cNvPr id="7" name="Picture 6">
-            <a:extLst>
-              <a:ext uri="{FF2B5EF4-FFF2-40B4-BE49-F238E27FC236}">
-                <a16:creationId xmlns:a16="http://schemas.microsoft.com/office/drawing/2014/main" id="{C19DB90B-C6A6-42C5-B88F-C71C9FC4E150}"/>
-              </a:ext>
-            </a:extLst>
-          </p:cNvPr>
-          <p:cNvPicPr>
-            <a:picLocks noChangeAspect="1"/>
-          </p:cNvPicPr>
-          <p:nvPr/>
-        </p:nvPicPr>
-        <p:blipFill>
-          <a:blip r:embed="rId2"/>
-          <a:stretch>
-            <a:fillRect/>
-          </a:stretch>
-        </p:blipFill>
-        <p:spPr>
-          <a:xfrm>
-            <a:off x="665909" y="962664"/>
-            <a:ext cx="8893270" cy="5930033"/>
-          </a:xfrm>
-          <a:prstGeom prst="rect">
-            <a:avLst/>
-          </a:prstGeom>
-        </p:spPr>
-      </p:pic>
-    </p:spTree>
-    <p:extLst>
-      <p:ext uri="{BB962C8B-B14F-4D97-AF65-F5344CB8AC3E}">
-        <p14:creationId xmlns:p14="http://schemas.microsoft.com/office/powerpoint/2010/main" val="2743959136"/>
-      </p:ext>
-    </p:extLst>
-  </p:cSld>
-  <p:clrMapOvr>
-    <a:masterClrMapping/>
-  </p:clrMapOvr>
-</p:sld>
-</file>
-
-<file path=ppt/slides/slide25.xml><?xml version="1.0" encoding="utf-8"?>
-<p:sld xmlns:a="http://schemas.openxmlformats.org/drawingml/2006/main" xmlns:r="http://schemas.openxmlformats.org/officeDocument/2006/relationships" xmlns:p="http://schemas.openxmlformats.org/presentationml/2006/main">
-  <p:cSld>
-    <p:spTree>
-      <p:nvGrpSpPr>
-        <p:cNvPr id="1" name=""/>
-        <p:cNvGrpSpPr/>
-        <p:nvPr/>
-      </p:nvGrpSpPr>
-      <p:grpSpPr>
-        <a:xfrm>
-          <a:off x="0" y="0"/>
-          <a:ext cx="0" cy="0"/>
-          <a:chOff x="0" y="0"/>
-          <a:chExt cx="0" cy="0"/>
-        </a:xfrm>
-      </p:grpSpPr>
-      <p:sp>
-        <p:nvSpPr>
-          <p:cNvPr id="2" name="Title 1">
-            <a:extLst>
-              <a:ext uri="{FF2B5EF4-FFF2-40B4-BE49-F238E27FC236}">
-                <a16:creationId xmlns:a16="http://schemas.microsoft.com/office/drawing/2014/main" id="{21B069AF-6569-4512-986F-E784F07B4C99}"/>
-              </a:ext>
-            </a:extLst>
-          </p:cNvPr>
-          <p:cNvSpPr>
-            <a:spLocks noGrp="1"/>
-          </p:cNvSpPr>
-          <p:nvPr>
-            <p:ph type="title"/>
-          </p:nvPr>
-        </p:nvSpPr>
-        <p:spPr/>
-        <p:txBody>
-          <a:bodyPr/>
-          <a:lstStyle/>
-          <a:p>
-            <a:r>
-              <a:rPr lang="en-US" dirty="0"/>
-              <a:t>fork() tracing</a:t>
-            </a:r>
-          </a:p>
-        </p:txBody>
-      </p:sp>
-      <p:sp>
-        <p:nvSpPr>
-          <p:cNvPr id="3" name="Content Placeholder 2">
-            <a:extLst>
-              <a:ext uri="{FF2B5EF4-FFF2-40B4-BE49-F238E27FC236}">
-                <a16:creationId xmlns:a16="http://schemas.microsoft.com/office/drawing/2014/main" id="{53DEEDDA-87CA-4C22-AA4E-82F071E2C328}"/>
-              </a:ext>
-            </a:extLst>
-          </p:cNvPr>
-          <p:cNvSpPr>
-            <a:spLocks noGrp="1"/>
-          </p:cNvSpPr>
-          <p:nvPr>
-            <p:ph idx="1"/>
-          </p:nvPr>
-        </p:nvSpPr>
-        <p:spPr/>
-        <p:txBody>
-          <a:bodyPr/>
-          <a:lstStyle/>
-          <a:p>
-            <a:endParaRPr lang="en-US"/>
-          </a:p>
-        </p:txBody>
-      </p:sp>
-      <p:sp>
-        <p:nvSpPr>
-          <p:cNvPr id="4" name="Footer Placeholder 3">
-            <a:extLst>
-              <a:ext uri="{FF2B5EF4-FFF2-40B4-BE49-F238E27FC236}">
-                <a16:creationId xmlns:a16="http://schemas.microsoft.com/office/drawing/2014/main" id="{BFF0C662-DC70-47C2-AC2A-9C1C793BEB82}"/>
-              </a:ext>
-            </a:extLst>
-          </p:cNvPr>
-          <p:cNvSpPr>
-            <a:spLocks noGrp="1"/>
-          </p:cNvSpPr>
-          <p:nvPr>
-            <p:ph type="ftr" idx="11"/>
-          </p:nvPr>
-        </p:nvSpPr>
-        <p:spPr/>
-        <p:txBody>
-          <a:bodyPr/>
-          <a:lstStyle/>
-          <a:p>
-            <a:pPr marL="0" marR="0" lvl="0" indent="0" algn="ctr" defTabSz="457200" rtl="0" eaLnBrk="1" fontAlgn="base" latinLnBrk="0" hangingPunct="0">
-              <a:lnSpc>
-                <a:spcPct val="96000"/>
-              </a:lnSpc>
-              <a:spcBef>
-                <a:spcPct val="0"/>
-              </a:spcBef>
-              <a:spcAft>
-                <a:spcPct val="0"/>
-              </a:spcAft>
-              <a:buClr>
-                <a:srgbClr val="000000"/>
-              </a:buClr>
-              <a:buSzPct val="100000"/>
-              <a:buFont typeface="Times New Roman" pitchFamily="16" charset="0"/>
-              <a:buNone/>
-              <a:tabLst>
-                <a:tab pos="0" algn="l"/>
-                <a:tab pos="457200" algn="l"/>
-                <a:tab pos="914400" algn="l"/>
-                <a:tab pos="1371600" algn="l"/>
-                <a:tab pos="1828800" algn="l"/>
-                <a:tab pos="2286000" algn="l"/>
-                <a:tab pos="2743200" algn="l"/>
-                <a:tab pos="3200400" algn="l"/>
-                <a:tab pos="3657600" algn="l"/>
-                <a:tab pos="4114800" algn="l"/>
-                <a:tab pos="4572000" algn="l"/>
-                <a:tab pos="5029200" algn="l"/>
-                <a:tab pos="5486400" algn="l"/>
-                <a:tab pos="5943600" algn="l"/>
-                <a:tab pos="6400800" algn="l"/>
-                <a:tab pos="6858000" algn="l"/>
-                <a:tab pos="7315200" algn="l"/>
-                <a:tab pos="7772400" algn="l"/>
-                <a:tab pos="8229600" algn="l"/>
-                <a:tab pos="8686800" algn="l"/>
-                <a:tab pos="9144000" algn="l"/>
-              </a:tabLst>
-              <a:defRPr/>
-            </a:pPr>
-            <a:r>
-              <a:rPr kumimoji="0" lang="en-US" sz="1400" b="0" i="0" u="none" strike="noStrike" kern="1200" cap="none" spc="0" normalizeH="0" baseline="0" noProof="0">
-                <a:ln>
-                  <a:noFill/>
-                </a:ln>
-                <a:solidFill>
-                  <a:srgbClr val="000000"/>
-                </a:solidFill>
-                <a:effectLst/>
-                <a:uLnTx/>
-                <a:uFillTx/>
-                <a:latin typeface="Arial"/>
-                <a:ea typeface="+mn-ea"/>
-                <a:cs typeface="Arial" charset="0"/>
-              </a:rPr>
-              <a:t>CS/COE 1550 – Operating Systems – Sherif Khattab</a:t>
-            </a:r>
-            <a:endParaRPr kumimoji="0" lang="en-GB" sz="1400" b="0" i="0" u="none" strike="noStrike" kern="1200" cap="none" spc="0" normalizeH="0" baseline="0" noProof="0" dirty="0">
-              <a:ln>
-                <a:noFill/>
-              </a:ln>
-              <a:solidFill>
-                <a:srgbClr val="000000"/>
-              </a:solidFill>
-              <a:effectLst/>
-              <a:uLnTx/>
-              <a:uFillTx/>
-              <a:latin typeface="Times New Roman" pitchFamily="16" charset="0"/>
-              <a:ea typeface="+mn-ea"/>
-              <a:cs typeface="Arial" charset="0"/>
-            </a:endParaRPr>
-          </a:p>
-        </p:txBody>
-      </p:sp>
-      <p:sp>
-        <p:nvSpPr>
-          <p:cNvPr id="5" name="Slide Number Placeholder 4">
-            <a:extLst>
-              <a:ext uri="{FF2B5EF4-FFF2-40B4-BE49-F238E27FC236}">
-                <a16:creationId xmlns:a16="http://schemas.microsoft.com/office/drawing/2014/main" id="{D2CA52D2-BB6F-4762-A6E0-F33C2E590D20}"/>
-              </a:ext>
-            </a:extLst>
-          </p:cNvPr>
-          <p:cNvSpPr>
-            <a:spLocks noGrp="1"/>
-          </p:cNvSpPr>
-          <p:nvPr>
-            <p:ph type="sldNum" idx="12"/>
-          </p:nvPr>
-        </p:nvSpPr>
-        <p:spPr/>
-        <p:txBody>
-          <a:bodyPr/>
-          <a:lstStyle/>
-          <a:p>
-            <a:pPr marL="0" marR="0" lvl="0" indent="0" algn="r" defTabSz="457200" rtl="0" eaLnBrk="1" fontAlgn="base" latinLnBrk="0" hangingPunct="0">
-              <a:lnSpc>
-                <a:spcPct val="96000"/>
-              </a:lnSpc>
-              <a:spcBef>
-                <a:spcPct val="0"/>
-              </a:spcBef>
-              <a:spcAft>
-                <a:spcPct val="0"/>
-              </a:spcAft>
-              <a:buClr>
-                <a:srgbClr val="000000"/>
-              </a:buClr>
-              <a:buSzPct val="100000"/>
-              <a:buFont typeface="Times New Roman" panose="02020603050405020304" pitchFamily="18" charset="0"/>
-              <a:buNone/>
-              <a:tabLst/>
-              <a:defRPr/>
-            </a:pPr>
-            <a:fld id="{65E435D9-63B0-4660-8D04-E83F5E2CA2AE}" type="slidenum">
-              <a:rPr kumimoji="0" lang="en-GB" altLang="en-US" sz="1400" b="0" i="0" u="none" strike="noStrike" kern="1200" cap="none" spc="0" normalizeH="0" baseline="0" noProof="0" smtClean="0">
-                <a:ln>
-                  <a:noFill/>
-                </a:ln>
-                <a:solidFill>
-                  <a:srgbClr val="000000"/>
-                </a:solidFill>
-                <a:effectLst/>
-                <a:uLnTx/>
-                <a:uFillTx/>
-                <a:latin typeface="Times New Roman" panose="02020603050405020304" pitchFamily="18" charset="0"/>
-                <a:ea typeface="+mn-ea"/>
-                <a:cs typeface="Arial" panose="020B0604020202020204" pitchFamily="34" charset="0"/>
-              </a:rPr>
-              <a:pPr marL="0" marR="0" lvl="0" indent="0" algn="r" defTabSz="457200" rtl="0" eaLnBrk="1" fontAlgn="base" latinLnBrk="0" hangingPunct="0">
-                <a:lnSpc>
-                  <a:spcPct val="96000"/>
-                </a:lnSpc>
-                <a:spcBef>
-                  <a:spcPct val="0"/>
-                </a:spcBef>
-                <a:spcAft>
-                  <a:spcPct val="0"/>
-                </a:spcAft>
-                <a:buClr>
-                  <a:srgbClr val="000000"/>
-                </a:buClr>
-                <a:buSzPct val="100000"/>
-                <a:buFont typeface="Times New Roman" panose="02020603050405020304" pitchFamily="18" charset="0"/>
-                <a:buNone/>
-                <a:tabLst/>
-                <a:defRPr/>
-              </a:pPr>
-              <a:t>25</a:t>
-            </a:fld>
-            <a:endParaRPr kumimoji="0" lang="en-GB" altLang="en-US" sz="1400" b="0" i="0" u="none" strike="noStrike" kern="1200" cap="none" spc="0" normalizeH="0" baseline="0" noProof="0" dirty="0">
-              <a:ln>
-                <a:noFill/>
-              </a:ln>
-              <a:solidFill>
-                <a:srgbClr val="000000"/>
-              </a:solidFill>
-              <a:effectLst/>
-              <a:uLnTx/>
-              <a:uFillTx/>
-              <a:latin typeface="Times New Roman" panose="02020603050405020304" pitchFamily="18" charset="0"/>
-              <a:ea typeface="+mn-ea"/>
-              <a:cs typeface="Arial" panose="020B0604020202020204" pitchFamily="34" charset="0"/>
-            </a:endParaRPr>
-          </a:p>
-        </p:txBody>
-      </p:sp>
-      <p:pic>
-        <p:nvPicPr>
-          <p:cNvPr id="7" name="Picture 6">
-            <a:extLst>
-              <a:ext uri="{FF2B5EF4-FFF2-40B4-BE49-F238E27FC236}">
-                <a16:creationId xmlns:a16="http://schemas.microsoft.com/office/drawing/2014/main" id="{A2165A44-E543-4E5D-ADBC-6FFA9E6C6982}"/>
-              </a:ext>
-            </a:extLst>
-          </p:cNvPr>
-          <p:cNvPicPr>
-            <a:picLocks noChangeAspect="1"/>
-          </p:cNvPicPr>
-          <p:nvPr/>
-        </p:nvPicPr>
-        <p:blipFill>
-          <a:blip r:embed="rId3"/>
-          <a:stretch>
-            <a:fillRect/>
-          </a:stretch>
-        </p:blipFill>
-        <p:spPr>
-          <a:xfrm>
-            <a:off x="398314" y="996286"/>
-            <a:ext cx="8856622" cy="5905596"/>
-          </a:xfrm>
-          <a:prstGeom prst="rect">
-            <a:avLst/>
-          </a:prstGeom>
-        </p:spPr>
-      </p:pic>
-    </p:spTree>
-    <p:extLst>
-      <p:ext uri="{BB962C8B-B14F-4D97-AF65-F5344CB8AC3E}">
-        <p14:creationId xmlns:p14="http://schemas.microsoft.com/office/powerpoint/2010/main" val="1845419114"/>
-      </p:ext>
-    </p:extLst>
-  </p:cSld>
-  <p:clrMapOvr>
-    <a:masterClrMapping/>
-  </p:clrMapOvr>
-</p:sld>
-</file>
-
-<file path=ppt/slides/slide26.xml><?xml version="1.0" encoding="utf-8"?>
-<p:sld xmlns:a="http://schemas.openxmlformats.org/drawingml/2006/main" xmlns:r="http://schemas.openxmlformats.org/officeDocument/2006/relationships" xmlns:p="http://schemas.openxmlformats.org/presentationml/2006/main">
-  <p:cSld>
-    <p:spTree>
-      <p:nvGrpSpPr>
-        <p:cNvPr id="1" name=""/>
-        <p:cNvGrpSpPr/>
-        <p:nvPr/>
-      </p:nvGrpSpPr>
-      <p:grpSpPr>
-        <a:xfrm>
-          <a:off x="0" y="0"/>
-          <a:ext cx="0" cy="0"/>
-          <a:chOff x="0" y="0"/>
-          <a:chExt cx="0" cy="0"/>
-        </a:xfrm>
-      </p:grpSpPr>
-      <p:sp>
-        <p:nvSpPr>
-          <p:cNvPr id="2" name="Title 1">
-            <a:extLst>
-              <a:ext uri="{FF2B5EF4-FFF2-40B4-BE49-F238E27FC236}">
-                <a16:creationId xmlns:a16="http://schemas.microsoft.com/office/drawing/2014/main" id="{9EB84ECC-A963-45D4-A10E-8ED34DA7EC35}"/>
-              </a:ext>
-            </a:extLst>
-          </p:cNvPr>
-          <p:cNvSpPr>
-            <a:spLocks noGrp="1"/>
-          </p:cNvSpPr>
-          <p:nvPr>
-            <p:ph type="title"/>
-          </p:nvPr>
-        </p:nvSpPr>
-        <p:spPr/>
-        <p:txBody>
-          <a:bodyPr/>
-          <a:lstStyle/>
-          <a:p>
-            <a:r>
-              <a:rPr lang="en-US" dirty="0"/>
-              <a:t>fork()’s of fork()’s</a:t>
-            </a:r>
-          </a:p>
-        </p:txBody>
-      </p:sp>
-      <p:sp>
-        <p:nvSpPr>
-          <p:cNvPr id="3" name="Content Placeholder 2">
-            <a:extLst>
-              <a:ext uri="{FF2B5EF4-FFF2-40B4-BE49-F238E27FC236}">
-                <a16:creationId xmlns:a16="http://schemas.microsoft.com/office/drawing/2014/main" id="{4BD0A427-7FF9-44C0-89AC-CDA907FC64C9}"/>
-              </a:ext>
-            </a:extLst>
-          </p:cNvPr>
-          <p:cNvSpPr>
-            <a:spLocks noGrp="1"/>
-          </p:cNvSpPr>
-          <p:nvPr>
-            <p:ph idx="1"/>
-          </p:nvPr>
-        </p:nvSpPr>
-        <p:spPr/>
-        <p:txBody>
-          <a:bodyPr/>
-          <a:lstStyle/>
-          <a:p>
-            <a:endParaRPr lang="en-US"/>
-          </a:p>
-        </p:txBody>
-      </p:sp>
-      <p:sp>
-        <p:nvSpPr>
-          <p:cNvPr id="4" name="Footer Placeholder 3">
-            <a:extLst>
-              <a:ext uri="{FF2B5EF4-FFF2-40B4-BE49-F238E27FC236}">
-                <a16:creationId xmlns:a16="http://schemas.microsoft.com/office/drawing/2014/main" id="{D89EF069-42A6-4C7D-A34F-6A405A2E2FFF}"/>
-              </a:ext>
-            </a:extLst>
-          </p:cNvPr>
-          <p:cNvSpPr>
-            <a:spLocks noGrp="1"/>
-          </p:cNvSpPr>
-          <p:nvPr>
-            <p:ph type="ftr" idx="11"/>
-          </p:nvPr>
-        </p:nvSpPr>
-        <p:spPr/>
-        <p:txBody>
-          <a:bodyPr/>
-          <a:lstStyle/>
-          <a:p>
-            <a:pPr marL="0" marR="0" lvl="0" indent="0" algn="ctr" defTabSz="457200" rtl="0" eaLnBrk="1" fontAlgn="base" latinLnBrk="0" hangingPunct="0">
-              <a:lnSpc>
-                <a:spcPct val="96000"/>
-              </a:lnSpc>
-              <a:spcBef>
-                <a:spcPct val="0"/>
-              </a:spcBef>
-              <a:spcAft>
-                <a:spcPct val="0"/>
-              </a:spcAft>
-              <a:buClr>
-                <a:srgbClr val="000000"/>
-              </a:buClr>
-              <a:buSzPct val="100000"/>
-              <a:buFont typeface="Times New Roman" pitchFamily="16" charset="0"/>
-              <a:buNone/>
-              <a:tabLst>
-                <a:tab pos="0" algn="l"/>
-                <a:tab pos="457200" algn="l"/>
-                <a:tab pos="914400" algn="l"/>
-                <a:tab pos="1371600" algn="l"/>
-                <a:tab pos="1828800" algn="l"/>
-                <a:tab pos="2286000" algn="l"/>
-                <a:tab pos="2743200" algn="l"/>
-                <a:tab pos="3200400" algn="l"/>
-                <a:tab pos="3657600" algn="l"/>
-                <a:tab pos="4114800" algn="l"/>
-                <a:tab pos="4572000" algn="l"/>
-                <a:tab pos="5029200" algn="l"/>
-                <a:tab pos="5486400" algn="l"/>
-                <a:tab pos="5943600" algn="l"/>
-                <a:tab pos="6400800" algn="l"/>
-                <a:tab pos="6858000" algn="l"/>
-                <a:tab pos="7315200" algn="l"/>
-                <a:tab pos="7772400" algn="l"/>
-                <a:tab pos="8229600" algn="l"/>
-                <a:tab pos="8686800" algn="l"/>
-                <a:tab pos="9144000" algn="l"/>
-              </a:tabLst>
-              <a:defRPr/>
-            </a:pPr>
-            <a:r>
-              <a:rPr kumimoji="0" lang="en-US" sz="1400" b="0" i="0" u="none" strike="noStrike" kern="1200" cap="none" spc="0" normalizeH="0" baseline="0" noProof="0">
-                <a:ln>
-                  <a:noFill/>
-                </a:ln>
-                <a:solidFill>
-                  <a:srgbClr val="000000"/>
-                </a:solidFill>
-                <a:effectLst/>
-                <a:uLnTx/>
-                <a:uFillTx/>
-                <a:latin typeface="Arial"/>
-                <a:ea typeface="+mn-ea"/>
-                <a:cs typeface="Arial" charset="0"/>
-              </a:rPr>
-              <a:t>CS/COE 1550 – Operating Systems – Sherif Khattab</a:t>
-            </a:r>
-            <a:endParaRPr kumimoji="0" lang="en-GB" sz="1400" b="0" i="0" u="none" strike="noStrike" kern="1200" cap="none" spc="0" normalizeH="0" baseline="0" noProof="0" dirty="0">
-              <a:ln>
-                <a:noFill/>
-              </a:ln>
-              <a:solidFill>
-                <a:srgbClr val="000000"/>
-              </a:solidFill>
-              <a:effectLst/>
-              <a:uLnTx/>
-              <a:uFillTx/>
-              <a:latin typeface="Times New Roman" pitchFamily="16" charset="0"/>
-              <a:ea typeface="+mn-ea"/>
-              <a:cs typeface="Arial" charset="0"/>
-            </a:endParaRPr>
-          </a:p>
-        </p:txBody>
-      </p:sp>
-      <p:sp>
-        <p:nvSpPr>
-          <p:cNvPr id="5" name="Slide Number Placeholder 4">
-            <a:extLst>
-              <a:ext uri="{FF2B5EF4-FFF2-40B4-BE49-F238E27FC236}">
-                <a16:creationId xmlns:a16="http://schemas.microsoft.com/office/drawing/2014/main" id="{EB1B3408-586A-4307-9797-81AEC12B005E}"/>
-              </a:ext>
-            </a:extLst>
-          </p:cNvPr>
-          <p:cNvSpPr>
-            <a:spLocks noGrp="1"/>
-          </p:cNvSpPr>
-          <p:nvPr>
-            <p:ph type="sldNum" idx="12"/>
-          </p:nvPr>
-        </p:nvSpPr>
-        <p:spPr/>
-        <p:txBody>
-          <a:bodyPr/>
-          <a:lstStyle/>
-          <a:p>
-            <a:pPr marL="0" marR="0" lvl="0" indent="0" algn="r" defTabSz="457200" rtl="0" eaLnBrk="1" fontAlgn="base" latinLnBrk="0" hangingPunct="0">
-              <a:lnSpc>
-                <a:spcPct val="96000"/>
-              </a:lnSpc>
-              <a:spcBef>
-                <a:spcPct val="0"/>
-              </a:spcBef>
-              <a:spcAft>
-                <a:spcPct val="0"/>
-              </a:spcAft>
-              <a:buClr>
-                <a:srgbClr val="000000"/>
-              </a:buClr>
-              <a:buSzPct val="100000"/>
-              <a:buFont typeface="Times New Roman" panose="02020603050405020304" pitchFamily="18" charset="0"/>
-              <a:buNone/>
-              <a:tabLst/>
-              <a:defRPr/>
-            </a:pPr>
-            <a:fld id="{65E435D9-63B0-4660-8D04-E83F5E2CA2AE}" type="slidenum">
-              <a:rPr kumimoji="0" lang="en-GB" altLang="en-US" sz="1400" b="0" i="0" u="none" strike="noStrike" kern="1200" cap="none" spc="0" normalizeH="0" baseline="0" noProof="0" smtClean="0">
-                <a:ln>
-                  <a:noFill/>
-                </a:ln>
-                <a:solidFill>
-                  <a:srgbClr val="000000"/>
-                </a:solidFill>
-                <a:effectLst/>
-                <a:uLnTx/>
-                <a:uFillTx/>
-                <a:latin typeface="Times New Roman" panose="02020603050405020304" pitchFamily="18" charset="0"/>
-                <a:ea typeface="+mn-ea"/>
-                <a:cs typeface="Arial" panose="020B0604020202020204" pitchFamily="34" charset="0"/>
-              </a:rPr>
-              <a:pPr marL="0" marR="0" lvl="0" indent="0" algn="r" defTabSz="457200" rtl="0" eaLnBrk="1" fontAlgn="base" latinLnBrk="0" hangingPunct="0">
-                <a:lnSpc>
-                  <a:spcPct val="96000"/>
-                </a:lnSpc>
-                <a:spcBef>
-                  <a:spcPct val="0"/>
-                </a:spcBef>
-                <a:spcAft>
-                  <a:spcPct val="0"/>
-                </a:spcAft>
-                <a:buClr>
-                  <a:srgbClr val="000000"/>
-                </a:buClr>
-                <a:buSzPct val="100000"/>
-                <a:buFont typeface="Times New Roman" panose="02020603050405020304" pitchFamily="18" charset="0"/>
-                <a:buNone/>
-                <a:tabLst/>
-                <a:defRPr/>
-              </a:pPr>
-              <a:t>26</a:t>
-            </a:fld>
-            <a:endParaRPr kumimoji="0" lang="en-GB" altLang="en-US" sz="1400" b="0" i="0" u="none" strike="noStrike" kern="1200" cap="none" spc="0" normalizeH="0" baseline="0" noProof="0" dirty="0">
-              <a:ln>
-                <a:noFill/>
-              </a:ln>
-              <a:solidFill>
-                <a:srgbClr val="000000"/>
-              </a:solidFill>
-              <a:effectLst/>
-              <a:uLnTx/>
-              <a:uFillTx/>
-              <a:latin typeface="Times New Roman" panose="02020603050405020304" pitchFamily="18" charset="0"/>
-              <a:ea typeface="+mn-ea"/>
-              <a:cs typeface="Arial" panose="020B0604020202020204" pitchFamily="34" charset="0"/>
-            </a:endParaRPr>
-          </a:p>
-        </p:txBody>
-      </p:sp>
-      <p:pic>
-        <p:nvPicPr>
-          <p:cNvPr id="7" name="Picture 6">
-            <a:extLst>
-              <a:ext uri="{FF2B5EF4-FFF2-40B4-BE49-F238E27FC236}">
-                <a16:creationId xmlns:a16="http://schemas.microsoft.com/office/drawing/2014/main" id="{F2F5B2AD-A872-4FA9-A92F-14E4C405740D}"/>
-              </a:ext>
-            </a:extLst>
-          </p:cNvPr>
-          <p:cNvPicPr>
-            <a:picLocks noChangeAspect="1"/>
-          </p:cNvPicPr>
-          <p:nvPr/>
-        </p:nvPicPr>
-        <p:blipFill>
-          <a:blip r:embed="rId2"/>
-          <a:stretch>
-            <a:fillRect/>
-          </a:stretch>
-        </p:blipFill>
-        <p:spPr>
-          <a:xfrm>
-            <a:off x="904259" y="1192033"/>
-            <a:ext cx="8416570" cy="5612169"/>
-          </a:xfrm>
-          <a:prstGeom prst="rect">
-            <a:avLst/>
-          </a:prstGeom>
-        </p:spPr>
-      </p:pic>
-    </p:spTree>
-    <p:extLst>
-      <p:ext uri="{BB962C8B-B14F-4D97-AF65-F5344CB8AC3E}">
-        <p14:creationId xmlns:p14="http://schemas.microsoft.com/office/powerpoint/2010/main" val="2093362943"/>
-      </p:ext>
-    </p:extLst>
-  </p:cSld>
-  <p:clrMapOvr>
-    <a:masterClrMapping/>
-  </p:clrMapOvr>
-</p:sld>
-</file>
-
-<file path=ppt/slides/slide27.xml><?xml version="1.0" encoding="utf-8"?>
-<p:sld xmlns:a="http://schemas.openxmlformats.org/drawingml/2006/main" xmlns:r="http://schemas.openxmlformats.org/officeDocument/2006/relationships" xmlns:p="http://schemas.openxmlformats.org/presentationml/2006/main">
-  <p:cSld>
-    <p:spTree>
-      <p:nvGrpSpPr>
-        <p:cNvPr id="1" name=""/>
-        <p:cNvGrpSpPr/>
-        <p:nvPr/>
-      </p:nvGrpSpPr>
-      <p:grpSpPr>
-        <a:xfrm>
-          <a:off x="0" y="0"/>
-          <a:ext cx="0" cy="0"/>
-          <a:chOff x="0" y="0"/>
-          <a:chExt cx="0" cy="0"/>
-        </a:xfrm>
-      </p:grpSpPr>
-      <p:sp>
-        <p:nvSpPr>
-          <p:cNvPr id="2" name="Title 1">
-            <a:extLst>
-              <a:ext uri="{FF2B5EF4-FFF2-40B4-BE49-F238E27FC236}">
-                <a16:creationId xmlns:a16="http://schemas.microsoft.com/office/drawing/2014/main" id="{863A8B5D-0DA9-1B40-B4F4-ACA6740ABCE2}"/>
-              </a:ext>
-            </a:extLst>
-          </p:cNvPr>
-          <p:cNvSpPr>
-            <a:spLocks noGrp="1"/>
-          </p:cNvSpPr>
-          <p:nvPr>
-            <p:ph type="title"/>
-          </p:nvPr>
-        </p:nvSpPr>
-        <p:spPr/>
-        <p:txBody>
-          <a:bodyPr/>
-          <a:lstStyle/>
-          <a:p>
-            <a:r>
-              <a:rPr lang="en-US" dirty="0"/>
-              <a:t>Process Lifecycle (AKA Process States)</a:t>
-            </a:r>
-          </a:p>
-        </p:txBody>
-      </p:sp>
-      <p:sp>
-        <p:nvSpPr>
-          <p:cNvPr id="3" name="Content Placeholder 2">
-            <a:extLst>
-              <a:ext uri="{FF2B5EF4-FFF2-40B4-BE49-F238E27FC236}">
-                <a16:creationId xmlns:a16="http://schemas.microsoft.com/office/drawing/2014/main" id="{ACD38833-3898-7F4F-A16C-3155350CEC94}"/>
-              </a:ext>
-            </a:extLst>
-          </p:cNvPr>
-          <p:cNvSpPr>
-            <a:spLocks noGrp="1"/>
-          </p:cNvSpPr>
-          <p:nvPr>
-            <p:ph idx="1"/>
-          </p:nvPr>
-        </p:nvSpPr>
-        <p:spPr/>
-        <p:txBody>
-          <a:bodyPr/>
-          <a:lstStyle/>
-          <a:p>
-            <a:endParaRPr lang="en-US"/>
-          </a:p>
-        </p:txBody>
-      </p:sp>
-      <p:sp>
-        <p:nvSpPr>
-          <p:cNvPr id="4" name="Footer Placeholder 3">
-            <a:extLst>
-              <a:ext uri="{FF2B5EF4-FFF2-40B4-BE49-F238E27FC236}">
-                <a16:creationId xmlns:a16="http://schemas.microsoft.com/office/drawing/2014/main" id="{1A44B5F0-571B-A540-A3A4-9FBA101355D0}"/>
-              </a:ext>
-            </a:extLst>
-          </p:cNvPr>
-          <p:cNvSpPr>
-            <a:spLocks noGrp="1"/>
-          </p:cNvSpPr>
-          <p:nvPr>
-            <p:ph type="ftr" idx="11"/>
-          </p:nvPr>
-        </p:nvSpPr>
-        <p:spPr/>
-        <p:txBody>
-          <a:bodyPr/>
-          <a:lstStyle/>
-          <a:p>
-            <a:pPr>
-              <a:defRPr/>
-            </a:pPr>
-            <a:r>
-              <a:rPr lang="en-US">
-                <a:latin typeface="+mn-lt"/>
-              </a:rPr>
-              <a:t>CS/COE 1550 – Operating Systems – Sherif Khattab</a:t>
-            </a:r>
-            <a:endParaRPr lang="en-GB" dirty="0"/>
-          </a:p>
-        </p:txBody>
-      </p:sp>
-      <p:sp>
-        <p:nvSpPr>
-          <p:cNvPr id="5" name="Slide Number Placeholder 4">
-            <a:extLst>
-              <a:ext uri="{FF2B5EF4-FFF2-40B4-BE49-F238E27FC236}">
-                <a16:creationId xmlns:a16="http://schemas.microsoft.com/office/drawing/2014/main" id="{CBC9F8A7-D797-6F40-9697-18D4AD3C7B79}"/>
-              </a:ext>
-            </a:extLst>
-          </p:cNvPr>
-          <p:cNvSpPr>
-            <a:spLocks noGrp="1"/>
-          </p:cNvSpPr>
-          <p:nvPr>
-            <p:ph type="sldNum" idx="12"/>
-          </p:nvPr>
-        </p:nvSpPr>
-        <p:spPr/>
-        <p:txBody>
-          <a:bodyPr/>
-          <a:lstStyle/>
-          <a:p>
-            <a:fld id="{65E435D9-63B0-4660-8D04-E83F5E2CA2AE}" type="slidenum">
-              <a:rPr lang="en-GB" altLang="en-US" smtClean="0"/>
-              <a:pPr/>
-              <a:t>27</a:t>
-            </a:fld>
-            <a:endParaRPr lang="en-GB" altLang="en-US" dirty="0"/>
-          </a:p>
-        </p:txBody>
-      </p:sp>
-      <p:pic>
-        <p:nvPicPr>
-          <p:cNvPr id="6" name="Picture 9">
-            <a:extLst>
-              <a:ext uri="{FF2B5EF4-FFF2-40B4-BE49-F238E27FC236}">
-                <a16:creationId xmlns:a16="http://schemas.microsoft.com/office/drawing/2014/main" id="{CBBDCD2A-B380-8C47-B634-E57BFDD137F1}"/>
-              </a:ext>
-            </a:extLst>
-          </p:cNvPr>
-          <p:cNvPicPr>
-            <a:picLocks noChangeAspect="1" noChangeArrowheads="1"/>
-          </p:cNvPicPr>
-          <p:nvPr/>
-        </p:nvPicPr>
-        <p:blipFill>
-          <a:blip r:embed="rId2">
-            <a:extLst>
-              <a:ext uri="{28A0092B-C50C-407E-A947-70E740481C1C}">
-                <a14:useLocalDpi xmlns:a14="http://schemas.microsoft.com/office/drawing/2010/main" val="0"/>
-              </a:ext>
-            </a:extLst>
-          </a:blip>
-          <a:srcRect/>
-          <a:stretch>
-            <a:fillRect/>
-          </a:stretch>
-        </p:blipFill>
-        <p:spPr bwMode="auto">
-          <a:xfrm>
-            <a:off x="304800" y="1806293"/>
-            <a:ext cx="9728200" cy="3879644"/>
-          </a:xfrm>
-          <a:prstGeom prst="rect">
-            <a:avLst/>
-          </a:prstGeom>
-          <a:noFill/>
-          <a:ln>
-            <a:noFill/>
-          </a:ln>
-          <a:extLst>
-            <a:ext uri="{909E8E84-426E-40DD-AFC4-6F175D3DCCD1}">
-              <a14:hiddenFill xmlns:a14="http://schemas.microsoft.com/office/drawing/2010/main">
-                <a:solidFill>
-                  <a:srgbClr val="FFFFFF"/>
-                </a:solidFill>
-              </a14:hiddenFill>
-            </a:ext>
-            <a:ext uri="{91240B29-F687-4F45-9708-019B960494DF}">
-              <a14:hiddenLine xmlns:a14="http://schemas.microsoft.com/office/drawing/2010/main" w="9525">
-                <a:solidFill>
-                  <a:srgbClr val="000000"/>
-                </a:solidFill>
-                <a:miter lim="800000"/>
-                <a:headEnd/>
-                <a:tailEnd/>
-              </a14:hiddenLine>
-            </a:ext>
-          </a:extLst>
-        </p:spPr>
-      </p:pic>
-    </p:spTree>
-    <p:extLst>
-      <p:ext uri="{BB962C8B-B14F-4D97-AF65-F5344CB8AC3E}">
-        <p14:creationId xmlns:p14="http://schemas.microsoft.com/office/powerpoint/2010/main" val="2710097941"/>
-      </p:ext>
-    </p:extLst>
-  </p:cSld>
-  <p:clrMapOvr>
-    <a:masterClrMapping/>
-  </p:clrMapOvr>
-</p:sld>
-</file>
-
-<file path=ppt/slides/slide28.xml><?xml version="1.0" encoding="utf-8"?>
-<p:sld xmlns:a="http://schemas.openxmlformats.org/drawingml/2006/main" xmlns:r="http://schemas.openxmlformats.org/officeDocument/2006/relationships" xmlns:p="http://schemas.openxmlformats.org/presentationml/2006/main">
-  <p:cSld>
-    <p:spTree>
-      <p:nvGrpSpPr>
-        <p:cNvPr id="1" name=""/>
-        <p:cNvGrpSpPr/>
-        <p:nvPr/>
-      </p:nvGrpSpPr>
-      <p:grpSpPr>
-        <a:xfrm>
-          <a:off x="0" y="0"/>
-          <a:ext cx="0" cy="0"/>
-          <a:chOff x="0" y="0"/>
-          <a:chExt cx="0" cy="0"/>
-        </a:xfrm>
-      </p:grpSpPr>
-      <p:sp>
-        <p:nvSpPr>
-          <p:cNvPr id="29698" name="Rectangle 2"/>
-          <p:cNvSpPr>
-            <a:spLocks noGrp="1" noChangeArrowheads="1"/>
-          </p:cNvSpPr>
-          <p:nvPr>
-            <p:ph type="title"/>
-          </p:nvPr>
-        </p:nvSpPr>
-        <p:spPr/>
-        <p:txBody>
-          <a:bodyPr/>
-          <a:lstStyle/>
-          <a:p>
-            <a:pPr eaLnBrk="1" hangingPunct="1"/>
-            <a:r>
-              <a:rPr lang="en-US" altLang="en-US">
-                <a:ea typeface="MS PGothic" charset="-128"/>
-              </a:rPr>
-              <a:t>Process Termination</a:t>
-            </a:r>
-          </a:p>
-        </p:txBody>
-      </p:sp>
-      <p:sp>
-        <p:nvSpPr>
-          <p:cNvPr id="29699" name="Rectangle 3"/>
-          <p:cNvSpPr>
-            <a:spLocks noGrp="1" noChangeArrowheads="1"/>
-          </p:cNvSpPr>
-          <p:nvPr>
-            <p:ph idx="1"/>
-          </p:nvPr>
-        </p:nvSpPr>
-        <p:spPr/>
-        <p:txBody>
-          <a:bodyPr>
-            <a:normAutofit lnSpcReduction="10000"/>
-          </a:bodyPr>
-          <a:lstStyle/>
-          <a:p>
-            <a:pPr lvl="1"/>
-            <a:endParaRPr lang="en-US" altLang="en-US" sz="882" dirty="0">
-              <a:ea typeface="MS PGothic" charset="-128"/>
-            </a:endParaRPr>
-          </a:p>
-          <a:p>
-            <a:r>
-              <a:rPr lang="en-US" altLang="en-US" dirty="0">
-                <a:ea typeface="MS PGothic" charset="-128"/>
-              </a:rPr>
-              <a:t>Via </a:t>
-            </a:r>
-            <a:r>
-              <a:rPr lang="en-US" altLang="en-US" b="1" dirty="0">
-                <a:latin typeface="Courier New" charset="0"/>
-                <a:ea typeface="MS PGothic" charset="-128"/>
-              </a:rPr>
-              <a:t>exit</a:t>
-            </a:r>
-            <a:r>
-              <a:rPr lang="en-US" altLang="en-US" dirty="0">
-                <a:ea typeface="MS PGothic" charset="-128"/>
-              </a:rPr>
-              <a:t>() or </a:t>
-            </a:r>
-            <a:r>
-              <a:rPr lang="en-US" altLang="en-US" b="1" dirty="0">
-                <a:latin typeface="Courier New" charset="0"/>
-                <a:ea typeface="MS PGothic" charset="-128"/>
-              </a:rPr>
-              <a:t>abort</a:t>
-            </a:r>
-            <a:r>
-              <a:rPr lang="en-US" altLang="en-US" dirty="0">
-                <a:ea typeface="MS PGothic" charset="-128"/>
-              </a:rPr>
-              <a:t>() </a:t>
-            </a:r>
-            <a:r>
-              <a:rPr lang="en-US" altLang="en-US" dirty="0" err="1">
-                <a:ea typeface="MS PGothic" charset="-128"/>
-              </a:rPr>
-              <a:t>syscalls</a:t>
-            </a:r>
-            <a:endParaRPr lang="en-US" altLang="en-US" dirty="0">
-              <a:ea typeface="MS PGothic" charset="-128"/>
-            </a:endParaRPr>
-          </a:p>
-          <a:p>
-            <a:r>
-              <a:rPr lang="en-US" altLang="en-US" dirty="0">
-                <a:ea typeface="MS PGothic" charset="-128"/>
-              </a:rPr>
-              <a:t>The parent process may wait for termination of a child process by using the </a:t>
-            </a:r>
-            <a:r>
-              <a:rPr lang="en-US" altLang="en-US" b="1" dirty="0">
-                <a:solidFill>
-                  <a:srgbClr val="000000"/>
-                </a:solidFill>
-                <a:latin typeface="Courier New" charset="0"/>
-                <a:ea typeface="MS PGothic" charset="-128"/>
-              </a:rPr>
-              <a:t>wait()</a:t>
-            </a:r>
-            <a:r>
-              <a:rPr lang="en-US" altLang="en-US" dirty="0">
-                <a:ea typeface="MS PGothic" charset="-128"/>
-              </a:rPr>
-              <a:t>system </a:t>
-            </a:r>
-            <a:r>
-              <a:rPr lang="en-US" altLang="en-US" dirty="0" err="1">
-                <a:ea typeface="MS PGothic" charset="-128"/>
-              </a:rPr>
-              <a:t>call</a:t>
-            </a:r>
-            <a:r>
-              <a:rPr lang="en-US" altLang="en-US" b="1" dirty="0" err="1">
-                <a:solidFill>
-                  <a:srgbClr val="000000"/>
-                </a:solidFill>
-                <a:latin typeface="Courier New" charset="0"/>
-                <a:ea typeface="MS PGothic" charset="-128"/>
-              </a:rPr>
-              <a:t>.</a:t>
-            </a:r>
-            <a:r>
-              <a:rPr lang="en-US" altLang="en-US" dirty="0" err="1">
-                <a:ea typeface="MS PGothic" charset="-128"/>
-              </a:rPr>
-              <a:t>The</a:t>
-            </a:r>
-            <a:r>
-              <a:rPr lang="en-US" altLang="en-US" dirty="0">
-                <a:ea typeface="MS PGothic" charset="-128"/>
-              </a:rPr>
-              <a:t> call returns status information and the </a:t>
-            </a:r>
-            <a:r>
-              <a:rPr lang="en-US" altLang="en-US" dirty="0" err="1">
-                <a:ea typeface="MS PGothic" charset="-128"/>
-              </a:rPr>
-              <a:t>pid</a:t>
-            </a:r>
-            <a:r>
-              <a:rPr lang="en-US" altLang="en-US" dirty="0">
-                <a:ea typeface="MS PGothic" charset="-128"/>
-              </a:rPr>
-              <a:t> of the terminated process</a:t>
-            </a:r>
-            <a:endParaRPr lang="en-US" altLang="en-US" b="1" dirty="0">
-              <a:solidFill>
-                <a:srgbClr val="000000"/>
-              </a:solidFill>
-              <a:latin typeface="Courier New" charset="0"/>
-              <a:ea typeface="MS PGothic" charset="-128"/>
-            </a:endParaRPr>
-          </a:p>
-          <a:p>
-            <a:pPr>
-              <a:buFont typeface="Monotype Sorts" charset="2"/>
-              <a:buNone/>
-            </a:pPr>
-            <a:r>
-              <a:rPr lang="en-US" altLang="en-US" b="1" dirty="0">
-                <a:solidFill>
-                  <a:srgbClr val="000000"/>
-                </a:solidFill>
-                <a:latin typeface="Courier New" charset="0"/>
-                <a:ea typeface="MS PGothic" charset="-128"/>
-              </a:rPr>
-              <a:t>      </a:t>
-            </a:r>
-            <a:r>
-              <a:rPr lang="en-US" altLang="en-US" b="1" dirty="0" err="1">
-                <a:solidFill>
-                  <a:srgbClr val="000000"/>
-                </a:solidFill>
-                <a:latin typeface="Courier New" charset="0"/>
-                <a:ea typeface="MS PGothic" charset="-128"/>
-              </a:rPr>
-              <a:t>pid</a:t>
-            </a:r>
-            <a:r>
-              <a:rPr lang="en-US" altLang="en-US" b="1" dirty="0">
-                <a:solidFill>
-                  <a:srgbClr val="000000"/>
-                </a:solidFill>
-                <a:latin typeface="Courier New" charset="0"/>
-                <a:ea typeface="MS PGothic" charset="-128"/>
-              </a:rPr>
-              <a:t> = wait(&amp;status); </a:t>
-            </a:r>
-          </a:p>
-          <a:p>
-            <a:r>
-              <a:rPr lang="en-US" altLang="en-US" dirty="0">
-                <a:ea typeface="MS PGothic" charset="-128"/>
-              </a:rPr>
-              <a:t>When a process terminates</a:t>
-            </a:r>
-          </a:p>
-          <a:p>
-            <a:pPr lvl="1"/>
-            <a:r>
-              <a:rPr lang="en-US" altLang="en-US" dirty="0">
-                <a:ea typeface="MS PGothic" charset="-128"/>
-              </a:rPr>
-              <a:t>If no parent waiting (did not invoke </a:t>
-            </a:r>
-            <a:r>
-              <a:rPr lang="en-US" altLang="en-US" b="1" dirty="0">
-                <a:solidFill>
-                  <a:srgbClr val="000000"/>
-                </a:solidFill>
-                <a:latin typeface="Courier New" charset="0"/>
-                <a:ea typeface="MS PGothic" charset="-128"/>
-              </a:rPr>
-              <a:t>wait()</a:t>
-            </a:r>
-            <a:r>
-              <a:rPr lang="en-US" altLang="en-US" dirty="0">
-                <a:ea typeface="MS PGothic" charset="-128"/>
-              </a:rPr>
-              <a:t>) process is a </a:t>
-            </a:r>
-            <a:r>
-              <a:rPr lang="en-US" altLang="en-US" b="1" dirty="0">
-                <a:solidFill>
-                  <a:srgbClr val="3366FF"/>
-                </a:solidFill>
-                <a:ea typeface="MS PGothic" charset="-128"/>
-              </a:rPr>
-              <a:t>zombie</a:t>
-            </a:r>
-          </a:p>
-          <a:p>
-            <a:pPr lvl="1"/>
-            <a:r>
-              <a:rPr lang="en-US" altLang="en-US" dirty="0">
-                <a:ea typeface="MS PGothic" charset="-128"/>
-              </a:rPr>
-              <a:t>If parent terminated without invoking</a:t>
-            </a:r>
-            <a:r>
-              <a:rPr lang="en-US" altLang="en-US" b="1" dirty="0">
-                <a:solidFill>
-                  <a:srgbClr val="000000"/>
-                </a:solidFill>
-                <a:latin typeface="Courier New" charset="0"/>
-                <a:ea typeface="MS PGothic" charset="-128"/>
-              </a:rPr>
-              <a:t> wait</a:t>
-            </a:r>
-            <a:r>
-              <a:rPr lang="en-US" altLang="en-US" dirty="0">
-                <a:ea typeface="MS PGothic" charset="-128"/>
-              </a:rPr>
-              <a:t> , process is an </a:t>
-            </a:r>
-            <a:r>
-              <a:rPr lang="en-US" altLang="en-US" b="1" dirty="0">
-                <a:solidFill>
-                  <a:srgbClr val="3366FF"/>
-                </a:solidFill>
-                <a:ea typeface="MS PGothic" charset="-128"/>
-              </a:rPr>
-              <a:t>orphan</a:t>
-            </a:r>
-          </a:p>
-          <a:p>
-            <a:pPr lvl="2"/>
-            <a:r>
-              <a:rPr lang="en-US" altLang="en-US" sz="2800" dirty="0">
-                <a:ea typeface="MS PGothic" charset="-128"/>
-              </a:rPr>
-              <a:t>adopted by the </a:t>
-            </a:r>
-            <a:r>
-              <a:rPr lang="en-US" altLang="en-US" sz="3200" b="1" dirty="0" err="1">
-                <a:latin typeface="Courier New" charset="0"/>
-                <a:ea typeface="MS PGothic" charset="-128"/>
-              </a:rPr>
-              <a:t>init</a:t>
-            </a:r>
-            <a:r>
-              <a:rPr lang="en-US" altLang="en-US" sz="2800" dirty="0">
-                <a:ea typeface="MS PGothic" charset="-128"/>
-              </a:rPr>
-              <a:t> process</a:t>
-            </a:r>
-          </a:p>
-        </p:txBody>
-      </p:sp>
-      <p:sp>
-        <p:nvSpPr>
-          <p:cNvPr id="3" name="Footer Placeholder 2"/>
-          <p:cNvSpPr>
-            <a:spLocks noGrp="1"/>
-          </p:cNvSpPr>
-          <p:nvPr>
-            <p:ph type="ftr" idx="11"/>
-          </p:nvPr>
-        </p:nvSpPr>
-        <p:spPr/>
-        <p:txBody>
-          <a:bodyPr/>
-          <a:lstStyle/>
-          <a:p>
-            <a:pPr marL="0" marR="0" lvl="0" indent="0" algn="ctr" defTabSz="457200" rtl="0" eaLnBrk="1" fontAlgn="base" latinLnBrk="0" hangingPunct="0">
-              <a:lnSpc>
-                <a:spcPct val="96000"/>
-              </a:lnSpc>
-              <a:spcBef>
-                <a:spcPct val="0"/>
-              </a:spcBef>
-              <a:spcAft>
-                <a:spcPct val="0"/>
-              </a:spcAft>
-              <a:buClr>
-                <a:srgbClr val="000000"/>
-              </a:buClr>
-              <a:buSzPct val="100000"/>
-              <a:buFont typeface="Times New Roman" pitchFamily="16" charset="0"/>
-              <a:buNone/>
-              <a:tabLst>
-                <a:tab pos="0" algn="l"/>
-                <a:tab pos="457200" algn="l"/>
-                <a:tab pos="914400" algn="l"/>
-                <a:tab pos="1371600" algn="l"/>
-                <a:tab pos="1828800" algn="l"/>
-                <a:tab pos="2286000" algn="l"/>
-                <a:tab pos="2743200" algn="l"/>
-                <a:tab pos="3200400" algn="l"/>
-                <a:tab pos="3657600" algn="l"/>
-                <a:tab pos="4114800" algn="l"/>
-                <a:tab pos="4572000" algn="l"/>
-                <a:tab pos="5029200" algn="l"/>
-                <a:tab pos="5486400" algn="l"/>
-                <a:tab pos="5943600" algn="l"/>
-                <a:tab pos="6400800" algn="l"/>
-                <a:tab pos="6858000" algn="l"/>
-                <a:tab pos="7315200" algn="l"/>
-                <a:tab pos="7772400" algn="l"/>
-                <a:tab pos="8229600" algn="l"/>
-                <a:tab pos="8686800" algn="l"/>
-                <a:tab pos="9144000" algn="l"/>
-              </a:tabLst>
-              <a:defRPr/>
-            </a:pPr>
-            <a:r>
-              <a:rPr kumimoji="0" lang="en-US" sz="1400" b="0" i="0" u="none" strike="noStrike" kern="1200" cap="none" spc="0" normalizeH="0" baseline="0" noProof="0">
-                <a:ln>
-                  <a:noFill/>
-                </a:ln>
-                <a:solidFill>
-                  <a:srgbClr val="000000"/>
-                </a:solidFill>
-                <a:effectLst/>
-                <a:uLnTx/>
-                <a:uFillTx/>
-                <a:latin typeface="Arial"/>
-                <a:ea typeface="+mn-ea"/>
-                <a:cs typeface="Arial" charset="0"/>
-              </a:rPr>
-              <a:t>CS/COE 1550 – Operating Systems – Sherif Khattab</a:t>
-            </a:r>
-            <a:endParaRPr kumimoji="0" lang="en-GB" sz="1400" b="0" i="0" u="none" strike="noStrike" kern="1200" cap="none" spc="0" normalizeH="0" baseline="0" noProof="0" dirty="0">
-              <a:ln>
-                <a:noFill/>
-              </a:ln>
-              <a:solidFill>
-                <a:srgbClr val="000000"/>
-              </a:solidFill>
-              <a:effectLst/>
-              <a:uLnTx/>
-              <a:uFillTx/>
-              <a:latin typeface="Times New Roman" pitchFamily="16" charset="0"/>
-              <a:ea typeface="+mn-ea"/>
-              <a:cs typeface="Arial" charset="0"/>
-            </a:endParaRPr>
-          </a:p>
-        </p:txBody>
-      </p:sp>
-      <p:sp>
-        <p:nvSpPr>
-          <p:cNvPr id="4" name="Slide Number Placeholder 3"/>
-          <p:cNvSpPr>
-            <a:spLocks noGrp="1"/>
-          </p:cNvSpPr>
-          <p:nvPr>
-            <p:ph type="sldNum" idx="12"/>
-          </p:nvPr>
-        </p:nvSpPr>
-        <p:spPr/>
-        <p:txBody>
-          <a:bodyPr/>
-          <a:lstStyle/>
-          <a:p>
-            <a:pPr marL="0" marR="0" lvl="0" indent="0" algn="r" defTabSz="457200" rtl="0" eaLnBrk="1" fontAlgn="base" latinLnBrk="0" hangingPunct="0">
-              <a:lnSpc>
-                <a:spcPct val="96000"/>
-              </a:lnSpc>
-              <a:spcBef>
-                <a:spcPct val="0"/>
-              </a:spcBef>
-              <a:spcAft>
-                <a:spcPct val="0"/>
-              </a:spcAft>
-              <a:buClr>
-                <a:srgbClr val="000000"/>
-              </a:buClr>
-              <a:buSzPct val="100000"/>
-              <a:buFont typeface="Times New Roman" panose="02020603050405020304" pitchFamily="18" charset="0"/>
-              <a:buNone/>
-              <a:tabLst/>
-              <a:defRPr/>
-            </a:pPr>
-            <a:fld id="{65E435D9-63B0-4660-8D04-E83F5E2CA2AE}" type="slidenum">
-              <a:rPr kumimoji="0" lang="en-GB" altLang="en-US" sz="1400" b="0" i="0" u="none" strike="noStrike" kern="1200" cap="none" spc="0" normalizeH="0" baseline="0" noProof="0" smtClean="0">
-                <a:ln>
-                  <a:noFill/>
-                </a:ln>
-                <a:solidFill>
-                  <a:srgbClr val="000000"/>
-                </a:solidFill>
-                <a:effectLst/>
-                <a:uLnTx/>
-                <a:uFillTx/>
-                <a:latin typeface="Times New Roman" panose="02020603050405020304" pitchFamily="18" charset="0"/>
-                <a:ea typeface="+mn-ea"/>
-                <a:cs typeface="Arial" panose="020B0604020202020204" pitchFamily="34" charset="0"/>
-              </a:rPr>
-              <a:pPr marL="0" marR="0" lvl="0" indent="0" algn="r" defTabSz="457200" rtl="0" eaLnBrk="1" fontAlgn="base" latinLnBrk="0" hangingPunct="0">
-                <a:lnSpc>
-                  <a:spcPct val="96000"/>
-                </a:lnSpc>
-                <a:spcBef>
-                  <a:spcPct val="0"/>
-                </a:spcBef>
-                <a:spcAft>
-                  <a:spcPct val="0"/>
-                </a:spcAft>
-                <a:buClr>
-                  <a:srgbClr val="000000"/>
-                </a:buClr>
-                <a:buSzPct val="100000"/>
-                <a:buFont typeface="Times New Roman" panose="02020603050405020304" pitchFamily="18" charset="0"/>
-                <a:buNone/>
-                <a:tabLst/>
-                <a:defRPr/>
-              </a:pPr>
-              <a:t>28</a:t>
-            </a:fld>
-            <a:endParaRPr kumimoji="0" lang="en-GB" altLang="en-US" sz="1400" b="0" i="0" u="none" strike="noStrike" kern="1200" cap="none" spc="0" normalizeH="0" baseline="0" noProof="0" dirty="0">
-              <a:ln>
-                <a:noFill/>
-              </a:ln>
-              <a:solidFill>
-                <a:srgbClr val="000000"/>
-              </a:solidFill>
-              <a:effectLst/>
-              <a:uLnTx/>
-              <a:uFillTx/>
-              <a:latin typeface="Times New Roman" panose="02020603050405020304" pitchFamily="18" charset="0"/>
-              <a:ea typeface="+mn-ea"/>
-              <a:cs typeface="Arial" panose="020B0604020202020204" pitchFamily="34" charset="0"/>
-            </a:endParaRPr>
-          </a:p>
-        </p:txBody>
-      </p:sp>
-    </p:spTree>
-    <p:extLst>
-      <p:ext uri="{BB962C8B-B14F-4D97-AF65-F5344CB8AC3E}">
-        <p14:creationId xmlns:p14="http://schemas.microsoft.com/office/powerpoint/2010/main" val="306268545"/>
-      </p:ext>
-    </p:extLst>
-  </p:cSld>
-  <p:clrMapOvr>
-    <a:masterClrMapping/>
-  </p:clrMapOvr>
-  <p:timing>
-    <p:tnLst>
-      <p:par>
-        <p:cTn id="1" dur="indefinite" restart="never" nodeType="tmRoot">
-          <p:childTnLst>
-            <p:seq concurrent="1" nextAc="seek">
-              <p:cTn id="2" dur="indefinite" nodeType="mainSeq">
-                <p:childTnLst>
-                  <p:par>
-                    <p:cTn id="3" fill="hold">
-                      <p:stCondLst>
-                        <p:cond delay="indefinite"/>
-                      </p:stCondLst>
-                      <p:childTnLst>
-                        <p:par>
-                          <p:cTn id="4" fill="hold">
-                            <p:stCondLst>
-                              <p:cond delay="0"/>
-                            </p:stCondLst>
-                            <p:childTnLst>
-                              <p:par>
-                                <p:cTn id="5" presetID="1" presetClass="entr" presetSubtype="0" fill="hold" nodeType="clickEffect">
-                                  <p:stCondLst>
-                                    <p:cond delay="0"/>
-                                  </p:stCondLst>
-                                  <p:childTnLst>
-                                    <p:set>
-                                      <p:cBhvr>
-                                        <p:cTn id="6" dur="1" fill="hold">
-                                          <p:stCondLst>
-                                            <p:cond delay="0"/>
-                                          </p:stCondLst>
-                                        </p:cTn>
-                                        <p:tgtEl>
-                                          <p:spTgt spid="29699">
-                                            <p:txEl>
-                                              <p:pRg st="1" end="1"/>
-                                            </p:txEl>
-                                          </p:spTgt>
-                                        </p:tgtEl>
-                                        <p:attrNameLst>
-                                          <p:attrName>style.visibility</p:attrName>
-                                        </p:attrNameLst>
-                                      </p:cBhvr>
-                                      <p:to>
-                                        <p:strVal val="visible"/>
-                                      </p:to>
-                                    </p:set>
-                                  </p:childTnLst>
-                                </p:cTn>
-                              </p:par>
-                            </p:childTnLst>
-                          </p:cTn>
-                        </p:par>
-                      </p:childTnLst>
-                    </p:cTn>
-                  </p:par>
-                  <p:par>
-                    <p:cTn id="7" fill="hold">
-                      <p:stCondLst>
-                        <p:cond delay="indefinite"/>
-                      </p:stCondLst>
-                      <p:childTnLst>
-                        <p:par>
-                          <p:cTn id="8" fill="hold">
-                            <p:stCondLst>
-                              <p:cond delay="0"/>
-                            </p:stCondLst>
-                            <p:childTnLst>
-                              <p:par>
-                                <p:cTn id="9" presetID="1" presetClass="entr" presetSubtype="0" fill="hold" nodeType="clickEffect">
-                                  <p:stCondLst>
-                                    <p:cond delay="0"/>
-                                  </p:stCondLst>
-                                  <p:childTnLst>
-                                    <p:set>
-                                      <p:cBhvr>
-                                        <p:cTn id="10" dur="1" fill="hold">
-                                          <p:stCondLst>
-                                            <p:cond delay="0"/>
-                                          </p:stCondLst>
-                                        </p:cTn>
-                                        <p:tgtEl>
-                                          <p:spTgt spid="29699">
-                                            <p:txEl>
-                                              <p:pRg st="2" end="2"/>
-                                            </p:txEl>
-                                          </p:spTgt>
-                                        </p:tgtEl>
-                                        <p:attrNameLst>
-                                          <p:attrName>style.visibility</p:attrName>
-                                        </p:attrNameLst>
-                                      </p:cBhvr>
-                                      <p:to>
-                                        <p:strVal val="visible"/>
-                                      </p:to>
-                                    </p:set>
-                                  </p:childTnLst>
-                                </p:cTn>
-                              </p:par>
-                            </p:childTnLst>
-                          </p:cTn>
-                        </p:par>
-                      </p:childTnLst>
-                    </p:cTn>
-                  </p:par>
-                  <p:par>
-                    <p:cTn id="11" fill="hold">
-                      <p:stCondLst>
-                        <p:cond delay="indefinite"/>
-                      </p:stCondLst>
-                      <p:childTnLst>
-                        <p:par>
-                          <p:cTn id="12" fill="hold">
-                            <p:stCondLst>
-                              <p:cond delay="0"/>
-                            </p:stCondLst>
-                            <p:childTnLst>
-                              <p:par>
-                                <p:cTn id="13" presetID="1" presetClass="entr" presetSubtype="0" fill="hold" nodeType="clickEffect">
-                                  <p:stCondLst>
-                                    <p:cond delay="0"/>
-                                  </p:stCondLst>
-                                  <p:childTnLst>
-                                    <p:set>
-                                      <p:cBhvr>
-                                        <p:cTn id="14" dur="1" fill="hold">
-                                          <p:stCondLst>
-                                            <p:cond delay="0"/>
-                                          </p:stCondLst>
-                                        </p:cTn>
-                                        <p:tgtEl>
-                                          <p:spTgt spid="29699">
-                                            <p:txEl>
-                                              <p:pRg st="3" end="3"/>
-                                            </p:txEl>
-                                          </p:spTgt>
-                                        </p:tgtEl>
-                                        <p:attrNameLst>
-                                          <p:attrName>style.visibility</p:attrName>
-                                        </p:attrNameLst>
-                                      </p:cBhvr>
-                                      <p:to>
-                                        <p:strVal val="visible"/>
-                                      </p:to>
-                                    </p:set>
-                                  </p:childTnLst>
-                                </p:cTn>
-                              </p:par>
-                            </p:childTnLst>
-                          </p:cTn>
-                        </p:par>
-                      </p:childTnLst>
-                    </p:cTn>
-                  </p:par>
-                  <p:par>
-                    <p:cTn id="15" fill="hold">
-                      <p:stCondLst>
-                        <p:cond delay="indefinite"/>
-                      </p:stCondLst>
-                      <p:childTnLst>
-                        <p:par>
-                          <p:cTn id="16" fill="hold">
-                            <p:stCondLst>
-                              <p:cond delay="0"/>
-                            </p:stCondLst>
-                            <p:childTnLst>
-                              <p:par>
-                                <p:cTn id="17" presetID="1" presetClass="entr" presetSubtype="0" fill="hold" nodeType="clickEffect">
-                                  <p:stCondLst>
-                                    <p:cond delay="0"/>
-                                  </p:stCondLst>
-                                  <p:childTnLst>
-                                    <p:set>
-                                      <p:cBhvr>
-                                        <p:cTn id="18" dur="1" fill="hold">
-                                          <p:stCondLst>
-                                            <p:cond delay="0"/>
-                                          </p:stCondLst>
-                                        </p:cTn>
-                                        <p:tgtEl>
-                                          <p:spTgt spid="29699">
-                                            <p:txEl>
-                                              <p:pRg st="4" end="4"/>
-                                            </p:txEl>
-                                          </p:spTgt>
-                                        </p:tgtEl>
-                                        <p:attrNameLst>
-                                          <p:attrName>style.visibility</p:attrName>
-                                        </p:attrNameLst>
-                                      </p:cBhvr>
-                                      <p:to>
-                                        <p:strVal val="visible"/>
-                                      </p:to>
-                                    </p:set>
-                                  </p:childTnLst>
-                                </p:cTn>
-                              </p:par>
-                            </p:childTnLst>
-                          </p:cTn>
-                        </p:par>
-                      </p:childTnLst>
-                    </p:cTn>
-                  </p:par>
-                  <p:par>
-                    <p:cTn id="19" fill="hold">
-                      <p:stCondLst>
-                        <p:cond delay="indefinite"/>
-                      </p:stCondLst>
-                      <p:childTnLst>
-                        <p:par>
-                          <p:cTn id="20" fill="hold">
-                            <p:stCondLst>
-                              <p:cond delay="0"/>
-                            </p:stCondLst>
-                            <p:childTnLst>
-                              <p:par>
-                                <p:cTn id="21" presetID="1" presetClass="entr" presetSubtype="0" fill="hold" nodeType="clickEffect">
-                                  <p:stCondLst>
-                                    <p:cond delay="0"/>
-                                  </p:stCondLst>
-                                  <p:childTnLst>
-                                    <p:set>
-                                      <p:cBhvr>
-                                        <p:cTn id="22" dur="1" fill="hold">
-                                          <p:stCondLst>
-                                            <p:cond delay="0"/>
-                                          </p:stCondLst>
-                                        </p:cTn>
-                                        <p:tgtEl>
-                                          <p:spTgt spid="29699">
-                                            <p:txEl>
-                                              <p:pRg st="5" end="5"/>
-                                            </p:txEl>
-                                          </p:spTgt>
-                                        </p:tgtEl>
-                                        <p:attrNameLst>
-                                          <p:attrName>style.visibility</p:attrName>
-                                        </p:attrNameLst>
-                                      </p:cBhvr>
-                                      <p:to>
-                                        <p:strVal val="visible"/>
-                                      </p:to>
-                                    </p:set>
-                                  </p:childTnLst>
-                                </p:cTn>
-                              </p:par>
-                            </p:childTnLst>
-                          </p:cTn>
-                        </p:par>
-                      </p:childTnLst>
-                    </p:cTn>
-                  </p:par>
-                  <p:par>
-                    <p:cTn id="23" fill="hold">
-                      <p:stCondLst>
-                        <p:cond delay="indefinite"/>
-                      </p:stCondLst>
-                      <p:childTnLst>
-                        <p:par>
-                          <p:cTn id="24" fill="hold">
-                            <p:stCondLst>
-                              <p:cond delay="0"/>
-                            </p:stCondLst>
-                            <p:childTnLst>
-                              <p:par>
-                                <p:cTn id="25" presetID="1" presetClass="entr" presetSubtype="0" fill="hold" nodeType="clickEffect">
-                                  <p:stCondLst>
-                                    <p:cond delay="0"/>
-                                  </p:stCondLst>
-                                  <p:childTnLst>
-                                    <p:set>
-                                      <p:cBhvr>
-                                        <p:cTn id="26" dur="1" fill="hold">
-                                          <p:stCondLst>
-                                            <p:cond delay="0"/>
-                                          </p:stCondLst>
-                                        </p:cTn>
-                                        <p:tgtEl>
-                                          <p:spTgt spid="29699">
-                                            <p:txEl>
-                                              <p:pRg st="6" end="6"/>
-                                            </p:txEl>
-                                          </p:spTgt>
-                                        </p:tgtEl>
-                                        <p:attrNameLst>
-                                          <p:attrName>style.visibility</p:attrName>
-                                        </p:attrNameLst>
-                                      </p:cBhvr>
-                                      <p:to>
-                                        <p:strVal val="visible"/>
-                                      </p:to>
-                                    </p:set>
-                                  </p:childTnLst>
-                                </p:cTn>
-                              </p:par>
-                            </p:childTnLst>
-                          </p:cTn>
-                        </p:par>
-                      </p:childTnLst>
-                    </p:cTn>
-                  </p:par>
-                  <p:par>
-                    <p:cTn id="27" fill="hold">
-                      <p:stCondLst>
-                        <p:cond delay="indefinite"/>
-                      </p:stCondLst>
-                      <p:childTnLst>
-                        <p:par>
-                          <p:cTn id="28" fill="hold">
-                            <p:stCondLst>
-                              <p:cond delay="0"/>
-                            </p:stCondLst>
-                            <p:childTnLst>
-                              <p:par>
-                                <p:cTn id="29" presetID="1" presetClass="entr" presetSubtype="0" fill="hold" nodeType="clickEffect">
-                                  <p:stCondLst>
-                                    <p:cond delay="0"/>
-                                  </p:stCondLst>
-                                  <p:childTnLst>
-                                    <p:set>
-                                      <p:cBhvr>
-                                        <p:cTn id="30" dur="1" fill="hold">
-                                          <p:stCondLst>
-                                            <p:cond delay="0"/>
-                                          </p:stCondLst>
-                                        </p:cTn>
-                                        <p:tgtEl>
-                                          <p:spTgt spid="29699">
-                                            <p:txEl>
-                                              <p:pRg st="7" end="7"/>
-                                            </p:txEl>
-                                          </p:spTgt>
-                                        </p:tgtEl>
-                                        <p:attrNameLst>
-                                          <p:attrName>style.visibility</p:attrName>
-                                        </p:attrNameLst>
-                                      </p:cBhvr>
-                                      <p:to>
-                                        <p:strVal val="visible"/>
-                                      </p:to>
-                                    </p:set>
-                                  </p:childTnLst>
-                                </p:cTn>
-                              </p:par>
-                            </p:childTnLst>
-                          </p:cTn>
-                        </p:par>
-                      </p:childTnLst>
-                    </p:cTn>
-                  </p:par>
-                </p:childTnLst>
-              </p:cTn>
-              <p:prevCondLst>
-                <p:cond evt="onPrev" delay="0">
-                  <p:tgtEl>
-                    <p:sldTgt/>
-                  </p:tgtEl>
-                </p:cond>
-              </p:prevCondLst>
-              <p:nextCondLst>
-                <p:cond evt="onNext" delay="0">
-                  <p:tgtEl>
-                    <p:sldTgt/>
-                  </p:tgtEl>
-                </p:cond>
-              </p:nextCondLst>
-            </p:seq>
-          </p:childTnLst>
-        </p:cTn>
-      </p:par>
-    </p:tnLst>
-  </p:timing>
-</p:sld>
-</file>
-
-<file path=ppt/slides/slide29.xml><?xml version="1.0" encoding="utf-8"?>
-<p:sld xmlns:a="http://schemas.openxmlformats.org/drawingml/2006/main" xmlns:r="http://schemas.openxmlformats.org/officeDocument/2006/relationships" xmlns:p="http://schemas.openxmlformats.org/presentationml/2006/main">
-  <p:cSld>
-    <p:spTree>
-      <p:nvGrpSpPr>
-        <p:cNvPr id="1" name=""/>
-        <p:cNvGrpSpPr/>
-        <p:nvPr/>
-      </p:nvGrpSpPr>
-      <p:grpSpPr>
-        <a:xfrm>
-          <a:off x="0" y="0"/>
-          <a:ext cx="0" cy="0"/>
-          <a:chOff x="0" y="0"/>
-          <a:chExt cx="0" cy="0"/>
-        </a:xfrm>
-      </p:grpSpPr>
-      <p:sp>
-        <p:nvSpPr>
-          <p:cNvPr id="2" name="Title 1">
-            <a:extLst>
-              <a:ext uri="{FF2B5EF4-FFF2-40B4-BE49-F238E27FC236}">
-                <a16:creationId xmlns:a16="http://schemas.microsoft.com/office/drawing/2014/main" id="{4CDF7C92-8AA2-4CD2-B245-54C2A5C9C9CD}"/>
-              </a:ext>
-            </a:extLst>
-          </p:cNvPr>
-          <p:cNvSpPr>
-            <a:spLocks noGrp="1"/>
-          </p:cNvSpPr>
-          <p:nvPr>
-            <p:ph type="title"/>
-          </p:nvPr>
-        </p:nvSpPr>
-        <p:spPr/>
-        <p:txBody>
-          <a:bodyPr/>
-          <a:lstStyle/>
-          <a:p>
-            <a:r>
-              <a:rPr lang="en-US" dirty="0"/>
-              <a:t>Orphan vs. Zombie Processes</a:t>
-            </a:r>
-          </a:p>
-        </p:txBody>
-      </p:sp>
-      <p:sp>
-        <p:nvSpPr>
-          <p:cNvPr id="3" name="Content Placeholder 2">
-            <a:extLst>
-              <a:ext uri="{FF2B5EF4-FFF2-40B4-BE49-F238E27FC236}">
-                <a16:creationId xmlns:a16="http://schemas.microsoft.com/office/drawing/2014/main" id="{47A150C5-F849-4D86-BCB3-6AA2007F50A4}"/>
-              </a:ext>
-            </a:extLst>
-          </p:cNvPr>
-          <p:cNvSpPr>
-            <a:spLocks noGrp="1"/>
-          </p:cNvSpPr>
-          <p:nvPr>
-            <p:ph idx="1"/>
-          </p:nvPr>
-        </p:nvSpPr>
-        <p:spPr/>
-        <p:txBody>
-          <a:bodyPr/>
-          <a:lstStyle/>
-          <a:p>
-            <a:endParaRPr lang="en-US"/>
-          </a:p>
-        </p:txBody>
-      </p:sp>
-      <p:sp>
-        <p:nvSpPr>
-          <p:cNvPr id="4" name="Footer Placeholder 3">
-            <a:extLst>
-              <a:ext uri="{FF2B5EF4-FFF2-40B4-BE49-F238E27FC236}">
-                <a16:creationId xmlns:a16="http://schemas.microsoft.com/office/drawing/2014/main" id="{D9AD5EC3-A110-499B-8B5A-593D0215BEBB}"/>
-              </a:ext>
-            </a:extLst>
-          </p:cNvPr>
-          <p:cNvSpPr>
-            <a:spLocks noGrp="1"/>
-          </p:cNvSpPr>
-          <p:nvPr>
-            <p:ph type="ftr" idx="11"/>
-          </p:nvPr>
-        </p:nvSpPr>
-        <p:spPr/>
-        <p:txBody>
-          <a:bodyPr/>
-          <a:lstStyle/>
-          <a:p>
-            <a:pPr marL="0" marR="0" lvl="0" indent="0" algn="ctr" defTabSz="457200" rtl="0" eaLnBrk="1" fontAlgn="base" latinLnBrk="0" hangingPunct="0">
-              <a:lnSpc>
-                <a:spcPct val="96000"/>
-              </a:lnSpc>
-              <a:spcBef>
-                <a:spcPct val="0"/>
-              </a:spcBef>
-              <a:spcAft>
-                <a:spcPct val="0"/>
-              </a:spcAft>
-              <a:buClr>
-                <a:srgbClr val="000000"/>
-              </a:buClr>
-              <a:buSzPct val="100000"/>
-              <a:buFont typeface="Times New Roman" pitchFamily="16" charset="0"/>
-              <a:buNone/>
-              <a:tabLst>
-                <a:tab pos="0" algn="l"/>
-                <a:tab pos="457200" algn="l"/>
-                <a:tab pos="914400" algn="l"/>
-                <a:tab pos="1371600" algn="l"/>
-                <a:tab pos="1828800" algn="l"/>
-                <a:tab pos="2286000" algn="l"/>
-                <a:tab pos="2743200" algn="l"/>
-                <a:tab pos="3200400" algn="l"/>
-                <a:tab pos="3657600" algn="l"/>
-                <a:tab pos="4114800" algn="l"/>
-                <a:tab pos="4572000" algn="l"/>
-                <a:tab pos="5029200" algn="l"/>
-                <a:tab pos="5486400" algn="l"/>
-                <a:tab pos="5943600" algn="l"/>
-                <a:tab pos="6400800" algn="l"/>
-                <a:tab pos="6858000" algn="l"/>
-                <a:tab pos="7315200" algn="l"/>
-                <a:tab pos="7772400" algn="l"/>
-                <a:tab pos="8229600" algn="l"/>
-                <a:tab pos="8686800" algn="l"/>
-                <a:tab pos="9144000" algn="l"/>
-              </a:tabLst>
-              <a:defRPr/>
-            </a:pPr>
-            <a:r>
-              <a:rPr kumimoji="0" lang="en-US" sz="1400" b="0" i="0" u="none" strike="noStrike" kern="1200" cap="none" spc="0" normalizeH="0" baseline="0" noProof="0">
-                <a:ln>
-                  <a:noFill/>
-                </a:ln>
-                <a:solidFill>
-                  <a:srgbClr val="000000"/>
-                </a:solidFill>
-                <a:effectLst/>
-                <a:uLnTx/>
-                <a:uFillTx/>
-                <a:latin typeface="Arial"/>
-                <a:ea typeface="+mn-ea"/>
-                <a:cs typeface="Arial" charset="0"/>
-              </a:rPr>
-              <a:t>CS/COE 1550 – Operating Systems – Sherif Khattab</a:t>
-            </a:r>
-            <a:endParaRPr kumimoji="0" lang="en-GB" sz="1400" b="0" i="0" u="none" strike="noStrike" kern="1200" cap="none" spc="0" normalizeH="0" baseline="0" noProof="0" dirty="0">
-              <a:ln>
-                <a:noFill/>
-              </a:ln>
-              <a:solidFill>
-                <a:srgbClr val="000000"/>
-              </a:solidFill>
-              <a:effectLst/>
-              <a:uLnTx/>
-              <a:uFillTx/>
-              <a:latin typeface="Times New Roman" pitchFamily="16" charset="0"/>
-              <a:ea typeface="+mn-ea"/>
-              <a:cs typeface="Arial" charset="0"/>
-            </a:endParaRPr>
-          </a:p>
-        </p:txBody>
-      </p:sp>
-      <p:sp>
-        <p:nvSpPr>
-          <p:cNvPr id="5" name="Slide Number Placeholder 4">
-            <a:extLst>
-              <a:ext uri="{FF2B5EF4-FFF2-40B4-BE49-F238E27FC236}">
-                <a16:creationId xmlns:a16="http://schemas.microsoft.com/office/drawing/2014/main" id="{EBBAC7CF-0B62-44FB-A05B-29D5F8B40048}"/>
-              </a:ext>
-            </a:extLst>
-          </p:cNvPr>
-          <p:cNvSpPr>
-            <a:spLocks noGrp="1"/>
-          </p:cNvSpPr>
-          <p:nvPr>
-            <p:ph type="sldNum" idx="12"/>
-          </p:nvPr>
-        </p:nvSpPr>
-        <p:spPr/>
-        <p:txBody>
-          <a:bodyPr/>
-          <a:lstStyle/>
-          <a:p>
-            <a:pPr marL="0" marR="0" lvl="0" indent="0" algn="r" defTabSz="457200" rtl="0" eaLnBrk="1" fontAlgn="base" latinLnBrk="0" hangingPunct="0">
-              <a:lnSpc>
-                <a:spcPct val="96000"/>
-              </a:lnSpc>
-              <a:spcBef>
-                <a:spcPct val="0"/>
-              </a:spcBef>
-              <a:spcAft>
-                <a:spcPct val="0"/>
-              </a:spcAft>
-              <a:buClr>
-                <a:srgbClr val="000000"/>
-              </a:buClr>
-              <a:buSzPct val="100000"/>
-              <a:buFont typeface="Times New Roman" panose="02020603050405020304" pitchFamily="18" charset="0"/>
-              <a:buNone/>
-              <a:tabLst/>
-              <a:defRPr/>
-            </a:pPr>
-            <a:fld id="{65E435D9-63B0-4660-8D04-E83F5E2CA2AE}" type="slidenum">
-              <a:rPr kumimoji="0" lang="en-GB" altLang="en-US" sz="1400" b="0" i="0" u="none" strike="noStrike" kern="1200" cap="none" spc="0" normalizeH="0" baseline="0" noProof="0" smtClean="0">
-                <a:ln>
-                  <a:noFill/>
-                </a:ln>
-                <a:solidFill>
-                  <a:srgbClr val="000000"/>
-                </a:solidFill>
-                <a:effectLst/>
-                <a:uLnTx/>
-                <a:uFillTx/>
-                <a:latin typeface="Times New Roman" panose="02020603050405020304" pitchFamily="18" charset="0"/>
-                <a:ea typeface="+mn-ea"/>
-                <a:cs typeface="Arial" panose="020B0604020202020204" pitchFamily="34" charset="0"/>
-              </a:rPr>
-              <a:pPr marL="0" marR="0" lvl="0" indent="0" algn="r" defTabSz="457200" rtl="0" eaLnBrk="1" fontAlgn="base" latinLnBrk="0" hangingPunct="0">
-                <a:lnSpc>
-                  <a:spcPct val="96000"/>
-                </a:lnSpc>
-                <a:spcBef>
-                  <a:spcPct val="0"/>
-                </a:spcBef>
-                <a:spcAft>
-                  <a:spcPct val="0"/>
-                </a:spcAft>
-                <a:buClr>
-                  <a:srgbClr val="000000"/>
-                </a:buClr>
-                <a:buSzPct val="100000"/>
-                <a:buFont typeface="Times New Roman" panose="02020603050405020304" pitchFamily="18" charset="0"/>
-                <a:buNone/>
-                <a:tabLst/>
-                <a:defRPr/>
-              </a:pPr>
-              <a:t>29</a:t>
-            </a:fld>
-            <a:endParaRPr kumimoji="0" lang="en-GB" altLang="en-US" sz="1400" b="0" i="0" u="none" strike="noStrike" kern="1200" cap="none" spc="0" normalizeH="0" baseline="0" noProof="0" dirty="0">
-              <a:ln>
-                <a:noFill/>
-              </a:ln>
-              <a:solidFill>
-                <a:srgbClr val="000000"/>
-              </a:solidFill>
-              <a:effectLst/>
-              <a:uLnTx/>
-              <a:uFillTx/>
-              <a:latin typeface="Times New Roman" panose="02020603050405020304" pitchFamily="18" charset="0"/>
-              <a:ea typeface="+mn-ea"/>
-              <a:cs typeface="Arial" panose="020B0604020202020204" pitchFamily="34" charset="0"/>
-            </a:endParaRPr>
-          </a:p>
-        </p:txBody>
-      </p:sp>
-      <p:pic>
-        <p:nvPicPr>
-          <p:cNvPr id="7" name="Picture 6">
-            <a:extLst>
-              <a:ext uri="{FF2B5EF4-FFF2-40B4-BE49-F238E27FC236}">
-                <a16:creationId xmlns:a16="http://schemas.microsoft.com/office/drawing/2014/main" id="{238CB2BB-984B-497A-B1B0-CC96CC2896B9}"/>
-              </a:ext>
-            </a:extLst>
-          </p:cNvPr>
-          <p:cNvPicPr>
-            <a:picLocks noChangeAspect="1"/>
-          </p:cNvPicPr>
-          <p:nvPr/>
-        </p:nvPicPr>
-        <p:blipFill>
-          <a:blip r:embed="rId2"/>
-          <a:stretch>
-            <a:fillRect/>
-          </a:stretch>
-        </p:blipFill>
-        <p:spPr>
-          <a:xfrm>
-            <a:off x="527326" y="983635"/>
-            <a:ext cx="9041642" cy="6028967"/>
-          </a:xfrm>
-          <a:prstGeom prst="rect">
-            <a:avLst/>
-          </a:prstGeom>
-        </p:spPr>
-      </p:pic>
-    </p:spTree>
-    <p:extLst>
-      <p:ext uri="{BB962C8B-B14F-4D97-AF65-F5344CB8AC3E}">
-        <p14:creationId xmlns:p14="http://schemas.microsoft.com/office/powerpoint/2010/main" val="2804781805"/>
-      </p:ext>
-    </p:extLst>
-  </p:cSld>
-  <p:clrMapOvr>
-    <a:masterClrMapping/>
-  </p:clrMapOvr>
-</p:sld>
-</file>
-
 <file path=ppt/slides/slide3.xml><?xml version="1.0" encoding="utf-8"?>
 <p:sld xmlns:a="http://schemas.openxmlformats.org/drawingml/2006/main" xmlns:r="http://schemas.openxmlformats.org/officeDocument/2006/relationships" xmlns:p="http://schemas.openxmlformats.org/presentationml/2006/main">
   <p:cSld>
@@ -30268,1196 +27477,6 @@
                                               <p:pRg st="6" end="6"/>
                                             </p:txEl>
                                           </p:spTgt>
-                                        </p:tgtEl>
-                                        <p:attrNameLst>
-                                          <p:attrName>style.visibility</p:attrName>
-                                        </p:attrNameLst>
-                                      </p:cBhvr>
-                                      <p:to>
-                                        <p:strVal val="visible"/>
-                                      </p:to>
-                                    </p:set>
-                                  </p:childTnLst>
-                                </p:cTn>
-                              </p:par>
-                            </p:childTnLst>
-                          </p:cTn>
-                        </p:par>
-                      </p:childTnLst>
-                    </p:cTn>
-                  </p:par>
-                </p:childTnLst>
-              </p:cTn>
-              <p:prevCondLst>
-                <p:cond evt="onPrev" delay="0">
-                  <p:tgtEl>
-                    <p:sldTgt/>
-                  </p:tgtEl>
-                </p:cond>
-              </p:prevCondLst>
-              <p:nextCondLst>
-                <p:cond evt="onNext" delay="0">
-                  <p:tgtEl>
-                    <p:sldTgt/>
-                  </p:tgtEl>
-                </p:cond>
-              </p:nextCondLst>
-            </p:seq>
-          </p:childTnLst>
-        </p:cTn>
-      </p:par>
-    </p:tnLst>
-  </p:timing>
-</p:sld>
-</file>
-
-<file path=ppt/slides/slide30.xml><?xml version="1.0" encoding="utf-8"?>
-<p:sld xmlns:a="http://schemas.openxmlformats.org/drawingml/2006/main" xmlns:r="http://schemas.openxmlformats.org/officeDocument/2006/relationships" xmlns:p="http://schemas.openxmlformats.org/presentationml/2006/main">
-  <p:cSld>
-    <p:spTree>
-      <p:nvGrpSpPr>
-        <p:cNvPr id="1" name=""/>
-        <p:cNvGrpSpPr/>
-        <p:nvPr/>
-      </p:nvGrpSpPr>
-      <p:grpSpPr>
-        <a:xfrm>
-          <a:off x="0" y="0"/>
-          <a:ext cx="0" cy="0"/>
-          <a:chOff x="0" y="0"/>
-          <a:chExt cx="0" cy="0"/>
-        </a:xfrm>
-      </p:grpSpPr>
-      <p:sp>
-        <p:nvSpPr>
-          <p:cNvPr id="2" name="Title 1">
-            <a:extLst>
-              <a:ext uri="{FF2B5EF4-FFF2-40B4-BE49-F238E27FC236}">
-                <a16:creationId xmlns:a16="http://schemas.microsoft.com/office/drawing/2014/main" id="{7D38A7C9-4D12-4AD6-9D0C-96896D1174D6}"/>
-              </a:ext>
-            </a:extLst>
-          </p:cNvPr>
-          <p:cNvSpPr>
-            <a:spLocks noGrp="1"/>
-          </p:cNvSpPr>
-          <p:nvPr>
-            <p:ph type="title"/>
-          </p:nvPr>
-        </p:nvSpPr>
-        <p:spPr/>
-        <p:txBody>
-          <a:bodyPr/>
-          <a:lstStyle/>
-          <a:p>
-            <a:r>
-              <a:rPr lang="en-US" dirty="0"/>
-              <a:t>Benefits of Orphan Processes</a:t>
-            </a:r>
-          </a:p>
-        </p:txBody>
-      </p:sp>
-      <p:sp>
-        <p:nvSpPr>
-          <p:cNvPr id="3" name="Content Placeholder 2">
-            <a:extLst>
-              <a:ext uri="{FF2B5EF4-FFF2-40B4-BE49-F238E27FC236}">
-                <a16:creationId xmlns:a16="http://schemas.microsoft.com/office/drawing/2014/main" id="{41FE772B-EE09-4082-9520-F2B439890E12}"/>
-              </a:ext>
-            </a:extLst>
-          </p:cNvPr>
-          <p:cNvSpPr>
-            <a:spLocks noGrp="1"/>
-          </p:cNvSpPr>
-          <p:nvPr>
-            <p:ph idx="1"/>
-          </p:nvPr>
-        </p:nvSpPr>
-        <p:spPr/>
-        <p:txBody>
-          <a:bodyPr/>
-          <a:lstStyle/>
-          <a:p>
-            <a:r>
-              <a:rPr lang="en-US" dirty="0"/>
-              <a:t>Allow a long-running job to continue running even after session (e.g., </a:t>
-            </a:r>
-            <a:r>
-              <a:rPr lang="en-US" dirty="0" err="1"/>
-              <a:t>ssh</a:t>
-            </a:r>
-            <a:r>
-              <a:rPr lang="en-US" dirty="0"/>
-              <a:t> connection) ends.</a:t>
-            </a:r>
-          </a:p>
-          <a:p>
-            <a:pPr lvl="1"/>
-            <a:r>
-              <a:rPr lang="en-US" dirty="0"/>
-              <a:t>The </a:t>
-            </a:r>
-            <a:r>
-              <a:rPr lang="en-US" dirty="0" err="1"/>
-              <a:t>nohup</a:t>
-            </a:r>
-            <a:r>
-              <a:rPr lang="en-US" dirty="0"/>
-              <a:t> command does that</a:t>
-            </a:r>
-          </a:p>
-          <a:p>
-            <a:r>
-              <a:rPr lang="en-US" dirty="0"/>
-              <a:t>Create daemon processes</a:t>
-            </a:r>
-          </a:p>
-          <a:p>
-            <a:pPr lvl="1"/>
-            <a:r>
-              <a:rPr lang="en-US" dirty="0"/>
-              <a:t>Long-running background processes adopted by the </a:t>
-            </a:r>
-            <a:r>
-              <a:rPr lang="en-US" dirty="0" err="1"/>
-              <a:t>init</a:t>
-            </a:r>
-            <a:r>
-              <a:rPr lang="en-US" dirty="0"/>
-              <a:t> process.</a:t>
-            </a:r>
-          </a:p>
-        </p:txBody>
-      </p:sp>
-      <p:sp>
-        <p:nvSpPr>
-          <p:cNvPr id="4" name="Footer Placeholder 3">
-            <a:extLst>
-              <a:ext uri="{FF2B5EF4-FFF2-40B4-BE49-F238E27FC236}">
-                <a16:creationId xmlns:a16="http://schemas.microsoft.com/office/drawing/2014/main" id="{CCE09C5D-B59D-4769-95E5-5A0868DC0891}"/>
-              </a:ext>
-            </a:extLst>
-          </p:cNvPr>
-          <p:cNvSpPr>
-            <a:spLocks noGrp="1"/>
-          </p:cNvSpPr>
-          <p:nvPr>
-            <p:ph type="ftr" idx="11"/>
-          </p:nvPr>
-        </p:nvSpPr>
-        <p:spPr/>
-        <p:txBody>
-          <a:bodyPr/>
-          <a:lstStyle/>
-          <a:p>
-            <a:pPr marL="0" marR="0" lvl="0" indent="0" algn="ctr" defTabSz="457200" rtl="0" eaLnBrk="1" fontAlgn="base" latinLnBrk="0" hangingPunct="0">
-              <a:lnSpc>
-                <a:spcPct val="96000"/>
-              </a:lnSpc>
-              <a:spcBef>
-                <a:spcPct val="0"/>
-              </a:spcBef>
-              <a:spcAft>
-                <a:spcPct val="0"/>
-              </a:spcAft>
-              <a:buClr>
-                <a:srgbClr val="000000"/>
-              </a:buClr>
-              <a:buSzPct val="100000"/>
-              <a:buFont typeface="Times New Roman" pitchFamily="16" charset="0"/>
-              <a:buNone/>
-              <a:tabLst>
-                <a:tab pos="0" algn="l"/>
-                <a:tab pos="457200" algn="l"/>
-                <a:tab pos="914400" algn="l"/>
-                <a:tab pos="1371600" algn="l"/>
-                <a:tab pos="1828800" algn="l"/>
-                <a:tab pos="2286000" algn="l"/>
-                <a:tab pos="2743200" algn="l"/>
-                <a:tab pos="3200400" algn="l"/>
-                <a:tab pos="3657600" algn="l"/>
-                <a:tab pos="4114800" algn="l"/>
-                <a:tab pos="4572000" algn="l"/>
-                <a:tab pos="5029200" algn="l"/>
-                <a:tab pos="5486400" algn="l"/>
-                <a:tab pos="5943600" algn="l"/>
-                <a:tab pos="6400800" algn="l"/>
-                <a:tab pos="6858000" algn="l"/>
-                <a:tab pos="7315200" algn="l"/>
-                <a:tab pos="7772400" algn="l"/>
-                <a:tab pos="8229600" algn="l"/>
-                <a:tab pos="8686800" algn="l"/>
-                <a:tab pos="9144000" algn="l"/>
-              </a:tabLst>
-              <a:defRPr/>
-            </a:pPr>
-            <a:r>
-              <a:rPr kumimoji="0" lang="en-US" sz="1400" b="0" i="0" u="none" strike="noStrike" kern="1200" cap="none" spc="0" normalizeH="0" baseline="0" noProof="0">
-                <a:ln>
-                  <a:noFill/>
-                </a:ln>
-                <a:solidFill>
-                  <a:srgbClr val="000000"/>
-                </a:solidFill>
-                <a:effectLst/>
-                <a:uLnTx/>
-                <a:uFillTx/>
-                <a:latin typeface="Arial"/>
-                <a:ea typeface="+mn-ea"/>
-                <a:cs typeface="Arial" charset="0"/>
-              </a:rPr>
-              <a:t>CS/COE 1550 – Operating Systems – Sherif Khattab</a:t>
-            </a:r>
-            <a:endParaRPr kumimoji="0" lang="en-GB" sz="1400" b="0" i="0" u="none" strike="noStrike" kern="1200" cap="none" spc="0" normalizeH="0" baseline="0" noProof="0" dirty="0">
-              <a:ln>
-                <a:noFill/>
-              </a:ln>
-              <a:solidFill>
-                <a:srgbClr val="000000"/>
-              </a:solidFill>
-              <a:effectLst/>
-              <a:uLnTx/>
-              <a:uFillTx/>
-              <a:latin typeface="Times New Roman" pitchFamily="16" charset="0"/>
-              <a:ea typeface="+mn-ea"/>
-              <a:cs typeface="Arial" charset="0"/>
-            </a:endParaRPr>
-          </a:p>
-        </p:txBody>
-      </p:sp>
-      <p:sp>
-        <p:nvSpPr>
-          <p:cNvPr id="5" name="Slide Number Placeholder 4">
-            <a:extLst>
-              <a:ext uri="{FF2B5EF4-FFF2-40B4-BE49-F238E27FC236}">
-                <a16:creationId xmlns:a16="http://schemas.microsoft.com/office/drawing/2014/main" id="{2A5CC058-700E-48DA-A355-E64076CE21C8}"/>
-              </a:ext>
-            </a:extLst>
-          </p:cNvPr>
-          <p:cNvSpPr>
-            <a:spLocks noGrp="1"/>
-          </p:cNvSpPr>
-          <p:nvPr>
-            <p:ph type="sldNum" idx="12"/>
-          </p:nvPr>
-        </p:nvSpPr>
-        <p:spPr/>
-        <p:txBody>
-          <a:bodyPr/>
-          <a:lstStyle/>
-          <a:p>
-            <a:pPr marL="0" marR="0" lvl="0" indent="0" algn="r" defTabSz="457200" rtl="0" eaLnBrk="1" fontAlgn="base" latinLnBrk="0" hangingPunct="0">
-              <a:lnSpc>
-                <a:spcPct val="96000"/>
-              </a:lnSpc>
-              <a:spcBef>
-                <a:spcPct val="0"/>
-              </a:spcBef>
-              <a:spcAft>
-                <a:spcPct val="0"/>
-              </a:spcAft>
-              <a:buClr>
-                <a:srgbClr val="000000"/>
-              </a:buClr>
-              <a:buSzPct val="100000"/>
-              <a:buFont typeface="Times New Roman" panose="02020603050405020304" pitchFamily="18" charset="0"/>
-              <a:buNone/>
-              <a:tabLst/>
-              <a:defRPr/>
-            </a:pPr>
-            <a:fld id="{65E435D9-63B0-4660-8D04-E83F5E2CA2AE}" type="slidenum">
-              <a:rPr kumimoji="0" lang="en-GB" altLang="en-US" sz="1400" b="0" i="0" u="none" strike="noStrike" kern="1200" cap="none" spc="0" normalizeH="0" baseline="0" noProof="0" smtClean="0">
-                <a:ln>
-                  <a:noFill/>
-                </a:ln>
-                <a:solidFill>
-                  <a:srgbClr val="000000"/>
-                </a:solidFill>
-                <a:effectLst/>
-                <a:uLnTx/>
-                <a:uFillTx/>
-                <a:latin typeface="Times New Roman" panose="02020603050405020304" pitchFamily="18" charset="0"/>
-                <a:ea typeface="+mn-ea"/>
-                <a:cs typeface="Arial" panose="020B0604020202020204" pitchFamily="34" charset="0"/>
-              </a:rPr>
-              <a:pPr marL="0" marR="0" lvl="0" indent="0" algn="r" defTabSz="457200" rtl="0" eaLnBrk="1" fontAlgn="base" latinLnBrk="0" hangingPunct="0">
-                <a:lnSpc>
-                  <a:spcPct val="96000"/>
-                </a:lnSpc>
-                <a:spcBef>
-                  <a:spcPct val="0"/>
-                </a:spcBef>
-                <a:spcAft>
-                  <a:spcPct val="0"/>
-                </a:spcAft>
-                <a:buClr>
-                  <a:srgbClr val="000000"/>
-                </a:buClr>
-                <a:buSzPct val="100000"/>
-                <a:buFont typeface="Times New Roman" panose="02020603050405020304" pitchFamily="18" charset="0"/>
-                <a:buNone/>
-                <a:tabLst/>
-                <a:defRPr/>
-              </a:pPr>
-              <a:t>30</a:t>
-            </a:fld>
-            <a:endParaRPr kumimoji="0" lang="en-GB" altLang="en-US" sz="1400" b="0" i="0" u="none" strike="noStrike" kern="1200" cap="none" spc="0" normalizeH="0" baseline="0" noProof="0" dirty="0">
-              <a:ln>
-                <a:noFill/>
-              </a:ln>
-              <a:solidFill>
-                <a:srgbClr val="000000"/>
-              </a:solidFill>
-              <a:effectLst/>
-              <a:uLnTx/>
-              <a:uFillTx/>
-              <a:latin typeface="Times New Roman" panose="02020603050405020304" pitchFamily="18" charset="0"/>
-              <a:ea typeface="+mn-ea"/>
-              <a:cs typeface="Arial" panose="020B0604020202020204" pitchFamily="34" charset="0"/>
-            </a:endParaRPr>
-          </a:p>
-        </p:txBody>
-      </p:sp>
-    </p:spTree>
-    <p:extLst>
-      <p:ext uri="{BB962C8B-B14F-4D97-AF65-F5344CB8AC3E}">
-        <p14:creationId xmlns:p14="http://schemas.microsoft.com/office/powerpoint/2010/main" val="1525193433"/>
-      </p:ext>
-    </p:extLst>
-  </p:cSld>
-  <p:clrMapOvr>
-    <a:masterClrMapping/>
-  </p:clrMapOvr>
-</p:sld>
-</file>
-
-<file path=ppt/slides/slide31.xml><?xml version="1.0" encoding="utf-8"?>
-<p:sld xmlns:a="http://schemas.openxmlformats.org/drawingml/2006/main" xmlns:r="http://schemas.openxmlformats.org/officeDocument/2006/relationships" xmlns:p="http://schemas.openxmlformats.org/presentationml/2006/main">
-  <p:cSld>
-    <p:spTree>
-      <p:nvGrpSpPr>
-        <p:cNvPr id="1" name=""/>
-        <p:cNvGrpSpPr/>
-        <p:nvPr/>
-      </p:nvGrpSpPr>
-      <p:grpSpPr>
-        <a:xfrm>
-          <a:off x="0" y="0"/>
-          <a:ext cx="0" cy="0"/>
-          <a:chOff x="0" y="0"/>
-          <a:chExt cx="0" cy="0"/>
-        </a:xfrm>
-      </p:grpSpPr>
-      <p:sp>
-        <p:nvSpPr>
-          <p:cNvPr id="2" name="Title 1">
-            <a:extLst>
-              <a:ext uri="{FF2B5EF4-FFF2-40B4-BE49-F238E27FC236}">
-                <a16:creationId xmlns:a16="http://schemas.microsoft.com/office/drawing/2014/main" id="{8964C184-2D6E-E348-A72F-9EE120A124BE}"/>
-              </a:ext>
-            </a:extLst>
-          </p:cNvPr>
-          <p:cNvSpPr>
-            <a:spLocks noGrp="1"/>
-          </p:cNvSpPr>
-          <p:nvPr>
-            <p:ph type="title"/>
-          </p:nvPr>
-        </p:nvSpPr>
-        <p:spPr/>
-        <p:txBody>
-          <a:bodyPr/>
-          <a:lstStyle/>
-          <a:p>
-            <a:r>
-              <a:rPr lang="en-US" dirty="0"/>
-              <a:t>Xv6 Code Walkthrough</a:t>
-            </a:r>
-          </a:p>
-        </p:txBody>
-      </p:sp>
-      <p:sp>
-        <p:nvSpPr>
-          <p:cNvPr id="3" name="Content Placeholder 2">
-            <a:extLst>
-              <a:ext uri="{FF2B5EF4-FFF2-40B4-BE49-F238E27FC236}">
-                <a16:creationId xmlns:a16="http://schemas.microsoft.com/office/drawing/2014/main" id="{C9F2EE5E-BD27-8542-A295-3D984042E511}"/>
-              </a:ext>
-            </a:extLst>
-          </p:cNvPr>
-          <p:cNvSpPr>
-            <a:spLocks noGrp="1"/>
-          </p:cNvSpPr>
-          <p:nvPr>
-            <p:ph idx="1"/>
-          </p:nvPr>
-        </p:nvSpPr>
-        <p:spPr/>
-        <p:txBody>
-          <a:bodyPr/>
-          <a:lstStyle/>
-          <a:p>
-            <a:r>
-              <a:rPr lang="en-US" dirty="0"/>
-              <a:t>fork()</a:t>
-            </a:r>
-          </a:p>
-          <a:p>
-            <a:r>
-              <a:rPr lang="en-US" dirty="0"/>
-              <a:t>exit()</a:t>
-            </a:r>
-          </a:p>
-          <a:p>
-            <a:r>
-              <a:rPr lang="en-US" dirty="0"/>
-              <a:t>wait()</a:t>
-            </a:r>
-          </a:p>
-        </p:txBody>
-      </p:sp>
-      <p:sp>
-        <p:nvSpPr>
-          <p:cNvPr id="4" name="Footer Placeholder 3">
-            <a:extLst>
-              <a:ext uri="{FF2B5EF4-FFF2-40B4-BE49-F238E27FC236}">
-                <a16:creationId xmlns:a16="http://schemas.microsoft.com/office/drawing/2014/main" id="{C1D0212D-6D34-3E4F-9A5A-06657E611481}"/>
-              </a:ext>
-            </a:extLst>
-          </p:cNvPr>
-          <p:cNvSpPr>
-            <a:spLocks noGrp="1"/>
-          </p:cNvSpPr>
-          <p:nvPr>
-            <p:ph type="ftr" idx="11"/>
-          </p:nvPr>
-        </p:nvSpPr>
-        <p:spPr/>
-        <p:txBody>
-          <a:bodyPr/>
-          <a:lstStyle/>
-          <a:p>
-            <a:pPr marL="0" marR="0" lvl="0" indent="0" algn="ctr" defTabSz="457200" rtl="0" eaLnBrk="1" fontAlgn="base" latinLnBrk="0" hangingPunct="0">
-              <a:lnSpc>
-                <a:spcPct val="96000"/>
-              </a:lnSpc>
-              <a:spcBef>
-                <a:spcPct val="0"/>
-              </a:spcBef>
-              <a:spcAft>
-                <a:spcPct val="0"/>
-              </a:spcAft>
-              <a:buClr>
-                <a:srgbClr val="000000"/>
-              </a:buClr>
-              <a:buSzPct val="100000"/>
-              <a:buFont typeface="Times New Roman" pitchFamily="16" charset="0"/>
-              <a:buNone/>
-              <a:tabLst>
-                <a:tab pos="0" algn="l"/>
-                <a:tab pos="457200" algn="l"/>
-                <a:tab pos="914400" algn="l"/>
-                <a:tab pos="1371600" algn="l"/>
-                <a:tab pos="1828800" algn="l"/>
-                <a:tab pos="2286000" algn="l"/>
-                <a:tab pos="2743200" algn="l"/>
-                <a:tab pos="3200400" algn="l"/>
-                <a:tab pos="3657600" algn="l"/>
-                <a:tab pos="4114800" algn="l"/>
-                <a:tab pos="4572000" algn="l"/>
-                <a:tab pos="5029200" algn="l"/>
-                <a:tab pos="5486400" algn="l"/>
-                <a:tab pos="5943600" algn="l"/>
-                <a:tab pos="6400800" algn="l"/>
-                <a:tab pos="6858000" algn="l"/>
-                <a:tab pos="7315200" algn="l"/>
-                <a:tab pos="7772400" algn="l"/>
-                <a:tab pos="8229600" algn="l"/>
-                <a:tab pos="8686800" algn="l"/>
-                <a:tab pos="9144000" algn="l"/>
-              </a:tabLst>
-              <a:defRPr/>
-            </a:pPr>
-            <a:r>
-              <a:rPr kumimoji="0" lang="en-US" sz="1400" b="0" i="0" u="none" strike="noStrike" kern="1200" cap="none" spc="0" normalizeH="0" baseline="0" noProof="0">
-                <a:ln>
-                  <a:noFill/>
-                </a:ln>
-                <a:solidFill>
-                  <a:srgbClr val="000000"/>
-                </a:solidFill>
-                <a:effectLst/>
-                <a:uLnTx/>
-                <a:uFillTx/>
-                <a:latin typeface="Arial"/>
-                <a:ea typeface="+mn-ea"/>
-                <a:cs typeface="Arial" charset="0"/>
-              </a:rPr>
-              <a:t>CS/COE 1550 – Operating Systems – Sherif Khattab</a:t>
-            </a:r>
-            <a:endParaRPr kumimoji="0" lang="en-GB" sz="1400" b="0" i="0" u="none" strike="noStrike" kern="1200" cap="none" spc="0" normalizeH="0" baseline="0" noProof="0" dirty="0">
-              <a:ln>
-                <a:noFill/>
-              </a:ln>
-              <a:solidFill>
-                <a:srgbClr val="000000"/>
-              </a:solidFill>
-              <a:effectLst/>
-              <a:uLnTx/>
-              <a:uFillTx/>
-              <a:latin typeface="Times New Roman" pitchFamily="16" charset="0"/>
-              <a:ea typeface="+mn-ea"/>
-              <a:cs typeface="Arial" charset="0"/>
-            </a:endParaRPr>
-          </a:p>
-        </p:txBody>
-      </p:sp>
-      <p:sp>
-        <p:nvSpPr>
-          <p:cNvPr id="5" name="Slide Number Placeholder 4">
-            <a:extLst>
-              <a:ext uri="{FF2B5EF4-FFF2-40B4-BE49-F238E27FC236}">
-                <a16:creationId xmlns:a16="http://schemas.microsoft.com/office/drawing/2014/main" id="{F08E759B-5433-A143-981C-7E601CE20D89}"/>
-              </a:ext>
-            </a:extLst>
-          </p:cNvPr>
-          <p:cNvSpPr>
-            <a:spLocks noGrp="1"/>
-          </p:cNvSpPr>
-          <p:nvPr>
-            <p:ph type="sldNum" idx="12"/>
-          </p:nvPr>
-        </p:nvSpPr>
-        <p:spPr/>
-        <p:txBody>
-          <a:bodyPr/>
-          <a:lstStyle/>
-          <a:p>
-            <a:pPr marL="0" marR="0" lvl="0" indent="0" algn="r" defTabSz="457200" rtl="0" eaLnBrk="1" fontAlgn="base" latinLnBrk="0" hangingPunct="0">
-              <a:lnSpc>
-                <a:spcPct val="96000"/>
-              </a:lnSpc>
-              <a:spcBef>
-                <a:spcPct val="0"/>
-              </a:spcBef>
-              <a:spcAft>
-                <a:spcPct val="0"/>
-              </a:spcAft>
-              <a:buClr>
-                <a:srgbClr val="000000"/>
-              </a:buClr>
-              <a:buSzPct val="100000"/>
-              <a:buFont typeface="Times New Roman" panose="02020603050405020304" pitchFamily="18" charset="0"/>
-              <a:buNone/>
-              <a:tabLst/>
-              <a:defRPr/>
-            </a:pPr>
-            <a:fld id="{65E435D9-63B0-4660-8D04-E83F5E2CA2AE}" type="slidenum">
-              <a:rPr kumimoji="0" lang="en-GB" altLang="en-US" sz="1400" b="0" i="0" u="none" strike="noStrike" kern="1200" cap="none" spc="0" normalizeH="0" baseline="0" noProof="0" smtClean="0">
-                <a:ln>
-                  <a:noFill/>
-                </a:ln>
-                <a:solidFill>
-                  <a:srgbClr val="000000"/>
-                </a:solidFill>
-                <a:effectLst/>
-                <a:uLnTx/>
-                <a:uFillTx/>
-                <a:latin typeface="Times New Roman" panose="02020603050405020304" pitchFamily="18" charset="0"/>
-                <a:ea typeface="+mn-ea"/>
-                <a:cs typeface="Arial" panose="020B0604020202020204" pitchFamily="34" charset="0"/>
-              </a:rPr>
-              <a:pPr marL="0" marR="0" lvl="0" indent="0" algn="r" defTabSz="457200" rtl="0" eaLnBrk="1" fontAlgn="base" latinLnBrk="0" hangingPunct="0">
-                <a:lnSpc>
-                  <a:spcPct val="96000"/>
-                </a:lnSpc>
-                <a:spcBef>
-                  <a:spcPct val="0"/>
-                </a:spcBef>
-                <a:spcAft>
-                  <a:spcPct val="0"/>
-                </a:spcAft>
-                <a:buClr>
-                  <a:srgbClr val="000000"/>
-                </a:buClr>
-                <a:buSzPct val="100000"/>
-                <a:buFont typeface="Times New Roman" panose="02020603050405020304" pitchFamily="18" charset="0"/>
-                <a:buNone/>
-                <a:tabLst/>
-                <a:defRPr/>
-              </a:pPr>
-              <a:t>31</a:t>
-            </a:fld>
-            <a:endParaRPr kumimoji="0" lang="en-GB" altLang="en-US" sz="1400" b="0" i="0" u="none" strike="noStrike" kern="1200" cap="none" spc="0" normalizeH="0" baseline="0" noProof="0" dirty="0">
-              <a:ln>
-                <a:noFill/>
-              </a:ln>
-              <a:solidFill>
-                <a:srgbClr val="000000"/>
-              </a:solidFill>
-              <a:effectLst/>
-              <a:uLnTx/>
-              <a:uFillTx/>
-              <a:latin typeface="Times New Roman" panose="02020603050405020304" pitchFamily="18" charset="0"/>
-              <a:ea typeface="+mn-ea"/>
-              <a:cs typeface="Arial" panose="020B0604020202020204" pitchFamily="34" charset="0"/>
-            </a:endParaRPr>
-          </a:p>
-        </p:txBody>
-      </p:sp>
-    </p:spTree>
-    <p:extLst>
-      <p:ext uri="{BB962C8B-B14F-4D97-AF65-F5344CB8AC3E}">
-        <p14:creationId xmlns:p14="http://schemas.microsoft.com/office/powerpoint/2010/main" val="4120720973"/>
-      </p:ext>
-    </p:extLst>
-  </p:cSld>
-  <p:clrMapOvr>
-    <a:masterClrMapping/>
-  </p:clrMapOvr>
-  <p:timing>
-    <p:tnLst>
-      <p:par>
-        <p:cTn id="1" dur="indefinite" restart="never" nodeType="tmRoot">
-          <p:childTnLst>
-            <p:seq concurrent="1" nextAc="seek">
-              <p:cTn id="2" dur="indefinite" nodeType="mainSeq">
-                <p:childTnLst>
-                  <p:par>
-                    <p:cTn id="3" fill="hold">
-                      <p:stCondLst>
-                        <p:cond delay="indefinite"/>
-                      </p:stCondLst>
-                      <p:childTnLst>
-                        <p:par>
-                          <p:cTn id="4" fill="hold">
-                            <p:stCondLst>
-                              <p:cond delay="0"/>
-                            </p:stCondLst>
-                            <p:childTnLst>
-                              <p:par>
-                                <p:cTn id="5" presetID="1" presetClass="entr" presetSubtype="0" fill="hold" nodeType="clickEffect">
-                                  <p:stCondLst>
-                                    <p:cond delay="0"/>
-                                  </p:stCondLst>
-                                  <p:childTnLst>
-                                    <p:set>
-                                      <p:cBhvr>
-                                        <p:cTn id="6" dur="1" fill="hold">
-                                          <p:stCondLst>
-                                            <p:cond delay="0"/>
-                                          </p:stCondLst>
-                                        </p:cTn>
-                                        <p:tgtEl>
-                                          <p:spTgt spid="3">
-                                            <p:txEl>
-                                              <p:pRg st="0" end="0"/>
-                                            </p:txEl>
-                                          </p:spTgt>
-                                        </p:tgtEl>
-                                        <p:attrNameLst>
-                                          <p:attrName>style.visibility</p:attrName>
-                                        </p:attrNameLst>
-                                      </p:cBhvr>
-                                      <p:to>
-                                        <p:strVal val="visible"/>
-                                      </p:to>
-                                    </p:set>
-                                  </p:childTnLst>
-                                </p:cTn>
-                              </p:par>
-                            </p:childTnLst>
-                          </p:cTn>
-                        </p:par>
-                      </p:childTnLst>
-                    </p:cTn>
-                  </p:par>
-                  <p:par>
-                    <p:cTn id="7" fill="hold">
-                      <p:stCondLst>
-                        <p:cond delay="indefinite"/>
-                      </p:stCondLst>
-                      <p:childTnLst>
-                        <p:par>
-                          <p:cTn id="8" fill="hold">
-                            <p:stCondLst>
-                              <p:cond delay="0"/>
-                            </p:stCondLst>
-                            <p:childTnLst>
-                              <p:par>
-                                <p:cTn id="9" presetID="1" presetClass="entr" presetSubtype="0" fill="hold" nodeType="clickEffect">
-                                  <p:stCondLst>
-                                    <p:cond delay="0"/>
-                                  </p:stCondLst>
-                                  <p:childTnLst>
-                                    <p:set>
-                                      <p:cBhvr>
-                                        <p:cTn id="10" dur="1" fill="hold">
-                                          <p:stCondLst>
-                                            <p:cond delay="0"/>
-                                          </p:stCondLst>
-                                        </p:cTn>
-                                        <p:tgtEl>
-                                          <p:spTgt spid="3">
-                                            <p:txEl>
-                                              <p:pRg st="1" end="1"/>
-                                            </p:txEl>
-                                          </p:spTgt>
-                                        </p:tgtEl>
-                                        <p:attrNameLst>
-                                          <p:attrName>style.visibility</p:attrName>
-                                        </p:attrNameLst>
-                                      </p:cBhvr>
-                                      <p:to>
-                                        <p:strVal val="visible"/>
-                                      </p:to>
-                                    </p:set>
-                                  </p:childTnLst>
-                                </p:cTn>
-                              </p:par>
-                            </p:childTnLst>
-                          </p:cTn>
-                        </p:par>
-                      </p:childTnLst>
-                    </p:cTn>
-                  </p:par>
-                  <p:par>
-                    <p:cTn id="11" fill="hold">
-                      <p:stCondLst>
-                        <p:cond delay="indefinite"/>
-                      </p:stCondLst>
-                      <p:childTnLst>
-                        <p:par>
-                          <p:cTn id="12" fill="hold">
-                            <p:stCondLst>
-                              <p:cond delay="0"/>
-                            </p:stCondLst>
-                            <p:childTnLst>
-                              <p:par>
-                                <p:cTn id="13" presetID="1" presetClass="entr" presetSubtype="0" fill="hold" nodeType="clickEffect">
-                                  <p:stCondLst>
-                                    <p:cond delay="0"/>
-                                  </p:stCondLst>
-                                  <p:childTnLst>
-                                    <p:set>
-                                      <p:cBhvr>
-                                        <p:cTn id="14" dur="1" fill="hold">
-                                          <p:stCondLst>
-                                            <p:cond delay="0"/>
-                                          </p:stCondLst>
-                                        </p:cTn>
-                                        <p:tgtEl>
-                                          <p:spTgt spid="3">
-                                            <p:txEl>
-                                              <p:pRg st="2" end="2"/>
-                                            </p:txEl>
-                                          </p:spTgt>
-                                        </p:tgtEl>
-                                        <p:attrNameLst>
-                                          <p:attrName>style.visibility</p:attrName>
-                                        </p:attrNameLst>
-                                      </p:cBhvr>
-                                      <p:to>
-                                        <p:strVal val="visible"/>
-                                      </p:to>
-                                    </p:set>
-                                  </p:childTnLst>
-                                </p:cTn>
-                              </p:par>
-                            </p:childTnLst>
-                          </p:cTn>
-                        </p:par>
-                      </p:childTnLst>
-                    </p:cTn>
-                  </p:par>
-                </p:childTnLst>
-              </p:cTn>
-              <p:prevCondLst>
-                <p:cond evt="onPrev" delay="0">
-                  <p:tgtEl>
-                    <p:sldTgt/>
-                  </p:tgtEl>
-                </p:cond>
-              </p:prevCondLst>
-              <p:nextCondLst>
-                <p:cond evt="onNext" delay="0">
-                  <p:tgtEl>
-                    <p:sldTgt/>
-                  </p:tgtEl>
-                </p:cond>
-              </p:nextCondLst>
-            </p:seq>
-          </p:childTnLst>
-        </p:cTn>
-      </p:par>
-    </p:tnLst>
-  </p:timing>
-</p:sld>
-</file>
-
-<file path=ppt/slides/slide32.xml><?xml version="1.0" encoding="utf-8"?>
-<p:sld xmlns:a="http://schemas.openxmlformats.org/drawingml/2006/main" xmlns:r="http://schemas.openxmlformats.org/officeDocument/2006/relationships" xmlns:p="http://schemas.openxmlformats.org/presentationml/2006/main">
-  <p:cSld>
-    <p:spTree>
-      <p:nvGrpSpPr>
-        <p:cNvPr id="1" name=""/>
-        <p:cNvGrpSpPr/>
-        <p:nvPr/>
-      </p:nvGrpSpPr>
-      <p:grpSpPr>
-        <a:xfrm>
-          <a:off x="0" y="0"/>
-          <a:ext cx="0" cy="0"/>
-          <a:chOff x="0" y="0"/>
-          <a:chExt cx="0" cy="0"/>
-        </a:xfrm>
-      </p:grpSpPr>
-      <p:sp>
-        <p:nvSpPr>
-          <p:cNvPr id="2" name="Title 1">
-            <a:extLst>
-              <a:ext uri="{FF2B5EF4-FFF2-40B4-BE49-F238E27FC236}">
-                <a16:creationId xmlns:a16="http://schemas.microsoft.com/office/drawing/2014/main" id="{FFE12BC5-5EA7-C845-A8E0-F8F61DD0257D}"/>
-              </a:ext>
-            </a:extLst>
-          </p:cNvPr>
-          <p:cNvSpPr>
-            <a:spLocks noGrp="1"/>
-          </p:cNvSpPr>
-          <p:nvPr>
-            <p:ph type="title"/>
-          </p:nvPr>
-        </p:nvSpPr>
-        <p:spPr/>
-        <p:txBody>
-          <a:bodyPr/>
-          <a:lstStyle/>
-          <a:p>
-            <a:r>
-              <a:rPr lang="en-US" dirty="0"/>
-              <a:t>Killing a waiting process</a:t>
-            </a:r>
-          </a:p>
-        </p:txBody>
-      </p:sp>
-      <p:sp>
-        <p:nvSpPr>
-          <p:cNvPr id="3" name="Content Placeholder 2">
-            <a:extLst>
-              <a:ext uri="{FF2B5EF4-FFF2-40B4-BE49-F238E27FC236}">
-                <a16:creationId xmlns:a16="http://schemas.microsoft.com/office/drawing/2014/main" id="{00D4CFE1-2AF7-B84A-972E-76BB11415F3C}"/>
-              </a:ext>
-            </a:extLst>
-          </p:cNvPr>
-          <p:cNvSpPr>
-            <a:spLocks noGrp="1"/>
-          </p:cNvSpPr>
-          <p:nvPr>
-            <p:ph idx="1"/>
-          </p:nvPr>
-        </p:nvSpPr>
-        <p:spPr/>
-        <p:txBody>
-          <a:bodyPr/>
-          <a:lstStyle/>
-          <a:p>
-            <a:endParaRPr lang="en-US"/>
-          </a:p>
-        </p:txBody>
-      </p:sp>
-      <p:sp>
-        <p:nvSpPr>
-          <p:cNvPr id="4" name="Footer Placeholder 3">
-            <a:extLst>
-              <a:ext uri="{FF2B5EF4-FFF2-40B4-BE49-F238E27FC236}">
-                <a16:creationId xmlns:a16="http://schemas.microsoft.com/office/drawing/2014/main" id="{7DCBAAFD-3B47-8648-9382-F0B483886D5C}"/>
-              </a:ext>
-            </a:extLst>
-          </p:cNvPr>
-          <p:cNvSpPr>
-            <a:spLocks noGrp="1"/>
-          </p:cNvSpPr>
-          <p:nvPr>
-            <p:ph type="ftr" idx="11"/>
-          </p:nvPr>
-        </p:nvSpPr>
-        <p:spPr/>
-        <p:txBody>
-          <a:bodyPr/>
-          <a:lstStyle/>
-          <a:p>
-            <a:pPr marL="0" marR="0" lvl="0" indent="0" algn="ctr" defTabSz="457200" rtl="0" eaLnBrk="1" fontAlgn="base" latinLnBrk="0" hangingPunct="0">
-              <a:lnSpc>
-                <a:spcPct val="96000"/>
-              </a:lnSpc>
-              <a:spcBef>
-                <a:spcPct val="0"/>
-              </a:spcBef>
-              <a:spcAft>
-                <a:spcPct val="0"/>
-              </a:spcAft>
-              <a:buClr>
-                <a:srgbClr val="000000"/>
-              </a:buClr>
-              <a:buSzPct val="100000"/>
-              <a:buFont typeface="Times New Roman" pitchFamily="16" charset="0"/>
-              <a:buNone/>
-              <a:tabLst>
-                <a:tab pos="0" algn="l"/>
-                <a:tab pos="457200" algn="l"/>
-                <a:tab pos="914400" algn="l"/>
-                <a:tab pos="1371600" algn="l"/>
-                <a:tab pos="1828800" algn="l"/>
-                <a:tab pos="2286000" algn="l"/>
-                <a:tab pos="2743200" algn="l"/>
-                <a:tab pos="3200400" algn="l"/>
-                <a:tab pos="3657600" algn="l"/>
-                <a:tab pos="4114800" algn="l"/>
-                <a:tab pos="4572000" algn="l"/>
-                <a:tab pos="5029200" algn="l"/>
-                <a:tab pos="5486400" algn="l"/>
-                <a:tab pos="5943600" algn="l"/>
-                <a:tab pos="6400800" algn="l"/>
-                <a:tab pos="6858000" algn="l"/>
-                <a:tab pos="7315200" algn="l"/>
-                <a:tab pos="7772400" algn="l"/>
-                <a:tab pos="8229600" algn="l"/>
-                <a:tab pos="8686800" algn="l"/>
-                <a:tab pos="9144000" algn="l"/>
-              </a:tabLst>
-              <a:defRPr/>
-            </a:pPr>
-            <a:r>
-              <a:rPr kumimoji="0" lang="en-US" sz="1400" b="0" i="0" u="none" strike="noStrike" kern="1200" cap="none" spc="0" normalizeH="0" baseline="0" noProof="0">
-                <a:ln>
-                  <a:noFill/>
-                </a:ln>
-                <a:solidFill>
-                  <a:srgbClr val="000000"/>
-                </a:solidFill>
-                <a:effectLst/>
-                <a:uLnTx/>
-                <a:uFillTx/>
-                <a:latin typeface="Arial"/>
-                <a:ea typeface="+mn-ea"/>
-                <a:cs typeface="Arial" charset="0"/>
-              </a:rPr>
-              <a:t>CS/COE 1550 – Operating Systems – Sherif Khattab</a:t>
-            </a:r>
-            <a:endParaRPr kumimoji="0" lang="en-GB" sz="1400" b="0" i="0" u="none" strike="noStrike" kern="1200" cap="none" spc="0" normalizeH="0" baseline="0" noProof="0" dirty="0">
-              <a:ln>
-                <a:noFill/>
-              </a:ln>
-              <a:solidFill>
-                <a:srgbClr val="000000"/>
-              </a:solidFill>
-              <a:effectLst/>
-              <a:uLnTx/>
-              <a:uFillTx/>
-              <a:latin typeface="Times New Roman" pitchFamily="16" charset="0"/>
-              <a:ea typeface="+mn-ea"/>
-              <a:cs typeface="Arial" charset="0"/>
-            </a:endParaRPr>
-          </a:p>
-        </p:txBody>
-      </p:sp>
-      <p:sp>
-        <p:nvSpPr>
-          <p:cNvPr id="5" name="Slide Number Placeholder 4">
-            <a:extLst>
-              <a:ext uri="{FF2B5EF4-FFF2-40B4-BE49-F238E27FC236}">
-                <a16:creationId xmlns:a16="http://schemas.microsoft.com/office/drawing/2014/main" id="{B2B12042-41F9-B944-BAE9-A00F32F5FF54}"/>
-              </a:ext>
-            </a:extLst>
-          </p:cNvPr>
-          <p:cNvSpPr>
-            <a:spLocks noGrp="1"/>
-          </p:cNvSpPr>
-          <p:nvPr>
-            <p:ph type="sldNum" idx="12"/>
-          </p:nvPr>
-        </p:nvSpPr>
-        <p:spPr/>
-        <p:txBody>
-          <a:bodyPr/>
-          <a:lstStyle/>
-          <a:p>
-            <a:pPr marL="0" marR="0" lvl="0" indent="0" algn="r" defTabSz="457200" rtl="0" eaLnBrk="1" fontAlgn="base" latinLnBrk="0" hangingPunct="0">
-              <a:lnSpc>
-                <a:spcPct val="96000"/>
-              </a:lnSpc>
-              <a:spcBef>
-                <a:spcPct val="0"/>
-              </a:spcBef>
-              <a:spcAft>
-                <a:spcPct val="0"/>
-              </a:spcAft>
-              <a:buClr>
-                <a:srgbClr val="000000"/>
-              </a:buClr>
-              <a:buSzPct val="100000"/>
-              <a:buFont typeface="Times New Roman" panose="02020603050405020304" pitchFamily="18" charset="0"/>
-              <a:buNone/>
-              <a:tabLst/>
-              <a:defRPr/>
-            </a:pPr>
-            <a:fld id="{65E435D9-63B0-4660-8D04-E83F5E2CA2AE}" type="slidenum">
-              <a:rPr kumimoji="0" lang="en-GB" altLang="en-US" sz="1400" b="0" i="0" u="none" strike="noStrike" kern="1200" cap="none" spc="0" normalizeH="0" baseline="0" noProof="0" smtClean="0">
-                <a:ln>
-                  <a:noFill/>
-                </a:ln>
-                <a:solidFill>
-                  <a:srgbClr val="000000"/>
-                </a:solidFill>
-                <a:effectLst/>
-                <a:uLnTx/>
-                <a:uFillTx/>
-                <a:latin typeface="Times New Roman" panose="02020603050405020304" pitchFamily="18" charset="0"/>
-                <a:ea typeface="+mn-ea"/>
-                <a:cs typeface="Arial" panose="020B0604020202020204" pitchFamily="34" charset="0"/>
-              </a:rPr>
-              <a:pPr marL="0" marR="0" lvl="0" indent="0" algn="r" defTabSz="457200" rtl="0" eaLnBrk="1" fontAlgn="base" latinLnBrk="0" hangingPunct="0">
-                <a:lnSpc>
-                  <a:spcPct val="96000"/>
-                </a:lnSpc>
-                <a:spcBef>
-                  <a:spcPct val="0"/>
-                </a:spcBef>
-                <a:spcAft>
-                  <a:spcPct val="0"/>
-                </a:spcAft>
-                <a:buClr>
-                  <a:srgbClr val="000000"/>
-                </a:buClr>
-                <a:buSzPct val="100000"/>
-                <a:buFont typeface="Times New Roman" panose="02020603050405020304" pitchFamily="18" charset="0"/>
-                <a:buNone/>
-                <a:tabLst/>
-                <a:defRPr/>
-              </a:pPr>
-              <a:t>32</a:t>
-            </a:fld>
-            <a:endParaRPr kumimoji="0" lang="en-GB" altLang="en-US" sz="1400" b="0" i="0" u="none" strike="noStrike" kern="1200" cap="none" spc="0" normalizeH="0" baseline="0" noProof="0" dirty="0">
-              <a:ln>
-                <a:noFill/>
-              </a:ln>
-              <a:solidFill>
-                <a:srgbClr val="000000"/>
-              </a:solidFill>
-              <a:effectLst/>
-              <a:uLnTx/>
-              <a:uFillTx/>
-              <a:latin typeface="Times New Roman" panose="02020603050405020304" pitchFamily="18" charset="0"/>
-              <a:ea typeface="+mn-ea"/>
-              <a:cs typeface="Arial" panose="020B0604020202020204" pitchFamily="34" charset="0"/>
-            </a:endParaRPr>
-          </a:p>
-        </p:txBody>
-      </p:sp>
-      <p:pic>
-        <p:nvPicPr>
-          <p:cNvPr id="6" name="Picture 5">
-            <a:extLst>
-              <a:ext uri="{FF2B5EF4-FFF2-40B4-BE49-F238E27FC236}">
-                <a16:creationId xmlns:a16="http://schemas.microsoft.com/office/drawing/2014/main" id="{96E479EE-72EA-5E4A-917B-FDE32F354919}"/>
-              </a:ext>
-            </a:extLst>
-          </p:cNvPr>
-          <p:cNvPicPr>
-            <a:picLocks noChangeAspect="1"/>
-          </p:cNvPicPr>
-          <p:nvPr/>
-        </p:nvPicPr>
-        <p:blipFill>
-          <a:blip r:embed="rId2"/>
-          <a:stretch>
-            <a:fillRect/>
-          </a:stretch>
-        </p:blipFill>
-        <p:spPr>
-          <a:xfrm>
-            <a:off x="387818" y="828692"/>
-            <a:ext cx="4141694" cy="3498451"/>
-          </a:xfrm>
-          <a:prstGeom prst="rect">
-            <a:avLst/>
-          </a:prstGeom>
-        </p:spPr>
-      </p:pic>
-      <p:pic>
-        <p:nvPicPr>
-          <p:cNvPr id="7" name="Picture 6">
-            <a:extLst>
-              <a:ext uri="{FF2B5EF4-FFF2-40B4-BE49-F238E27FC236}">
-                <a16:creationId xmlns:a16="http://schemas.microsoft.com/office/drawing/2014/main" id="{CE8A8D63-F641-DB4C-93B9-D4BFCDD98673}"/>
-              </a:ext>
-            </a:extLst>
-          </p:cNvPr>
-          <p:cNvPicPr>
-            <a:picLocks noChangeAspect="1"/>
-          </p:cNvPicPr>
-          <p:nvPr/>
-        </p:nvPicPr>
-        <p:blipFill>
-          <a:blip r:embed="rId3"/>
-          <a:stretch>
-            <a:fillRect/>
-          </a:stretch>
-        </p:blipFill>
-        <p:spPr>
-          <a:xfrm>
-            <a:off x="197644" y="4789861"/>
-            <a:ext cx="9829800" cy="2070100"/>
-          </a:xfrm>
-          <a:prstGeom prst="rect">
-            <a:avLst/>
-          </a:prstGeom>
-        </p:spPr>
-      </p:pic>
-    </p:spTree>
-    <p:extLst>
-      <p:ext uri="{BB962C8B-B14F-4D97-AF65-F5344CB8AC3E}">
-        <p14:creationId xmlns:p14="http://schemas.microsoft.com/office/powerpoint/2010/main" val="3419089429"/>
-      </p:ext>
-    </p:extLst>
-  </p:cSld>
-  <p:clrMapOvr>
-    <a:masterClrMapping/>
-  </p:clrMapOvr>
-  <p:timing>
-    <p:tnLst>
-      <p:par>
-        <p:cTn id="1" dur="indefinite" restart="never" nodeType="tmRoot">
-          <p:childTnLst>
-            <p:seq concurrent="1" nextAc="seek">
-              <p:cTn id="2" dur="indefinite" nodeType="mainSeq">
-                <p:childTnLst>
-                  <p:par>
-                    <p:cTn id="3" fill="hold">
-                      <p:stCondLst>
-                        <p:cond delay="indefinite"/>
-                      </p:stCondLst>
-                      <p:childTnLst>
-                        <p:par>
-                          <p:cTn id="4" fill="hold">
-                            <p:stCondLst>
-                              <p:cond delay="0"/>
-                            </p:stCondLst>
-                            <p:childTnLst>
-                              <p:par>
-                                <p:cTn id="5" presetID="1" presetClass="entr" presetSubtype="0" fill="hold" nodeType="clickEffect">
-                                  <p:stCondLst>
-                                    <p:cond delay="0"/>
-                                  </p:stCondLst>
-                                  <p:childTnLst>
-                                    <p:set>
-                                      <p:cBhvr>
-                                        <p:cTn id="6" dur="1" fill="hold">
-                                          <p:stCondLst>
-                                            <p:cond delay="0"/>
-                                          </p:stCondLst>
-                                        </p:cTn>
-                                        <p:tgtEl>
-                                          <p:spTgt spid="7"/>
                                         </p:tgtEl>
                                         <p:attrNameLst>
                                           <p:attrName>style.visibility</p:attrName>

</xml_diff>